<commit_message>
Gram-Schmidt 설명 방법 수정
</commit_message>
<xml_diff>
--- a/pics/2020-11-23-gram_schmidt/pics.pptx
+++ b/pics/2020-11-23-gram_schmidt/pics.pptx
@@ -5,8 +5,10 @@
     <p:sldMasterId id="2147483648" r:id="rId1"/>
   </p:sldMasterIdLst>
   <p:sldIdLst>
-    <p:sldId id="256" r:id="rId2"/>
-    <p:sldId id="257" r:id="rId3"/>
+    <p:sldId id="258" r:id="rId2"/>
+    <p:sldId id="259" r:id="rId3"/>
+    <p:sldId id="256" r:id="rId4"/>
+    <p:sldId id="257" r:id="rId5"/>
   </p:sldIdLst>
   <p:sldSz cx="9144000" cy="6858000" type="screen4x3"/>
   <p:notesSz cx="6858000" cy="9144000"/>
@@ -105,6 +107,22 @@
       </a:defRPr>
     </a:lvl9pPr>
   </p:defaultTextStyle>
+  <p:extLst>
+    <p:ext uri="{EFAFB233-063F-42B5-8137-9DF3F51BA10A}">
+      <p15:sldGuideLst xmlns:p15="http://schemas.microsoft.com/office/powerpoint/2012/main">
+        <p15:guide id="1" orient="horz" pos="2160">
+          <p15:clr>
+            <a:srgbClr val="A4A3A4"/>
+          </p15:clr>
+        </p15:guide>
+        <p15:guide id="2" pos="2880">
+          <p15:clr>
+            <a:srgbClr val="A4A3A4"/>
+          </p15:clr>
+        </p15:guide>
+      </p15:sldGuideLst>
+    </p:ext>
+  </p:extLst>
 </p:presentation>
 </file>
 
@@ -146,10 +164,9 @@
           <a:lstStyle/>
           <a:p>
             <a:r>
-              <a:rPr lang="ko-KR" altLang="en-US" smtClean="0"/>
+              <a:rPr lang="ko-KR" altLang="en-US"/>
               <a:t>마스터 제목 스타일 편집</a:t>
             </a:r>
-            <a:endParaRPr lang="ko-KR" altLang="en-US"/>
           </a:p>
         </p:txBody>
       </p:sp>
@@ -265,10 +282,9 @@
           </a:lstStyle>
           <a:p>
             <a:r>
-              <a:rPr lang="ko-KR" altLang="en-US" smtClean="0"/>
+              <a:rPr lang="ko-KR" altLang="en-US"/>
               <a:t>마스터 부제목 스타일 편집</a:t>
             </a:r>
-            <a:endParaRPr lang="ko-KR" altLang="en-US"/>
           </a:p>
         </p:txBody>
       </p:sp>
@@ -289,7 +305,7 @@
           <a:p>
             <a:fld id="{5E8ADD9A-8404-4EFD-A151-495D085594E9}" type="datetimeFigureOut">
               <a:rPr lang="ko-KR" altLang="en-US" smtClean="0"/>
-              <a:t>2020-11-25</a:t>
+              <a:t>2021-01-31</a:t>
             </a:fld>
             <a:endParaRPr lang="ko-KR" altLang="en-US"/>
           </a:p>
@@ -383,10 +399,9 @@
           <a:lstStyle/>
           <a:p>
             <a:r>
-              <a:rPr lang="ko-KR" altLang="en-US" smtClean="0"/>
+              <a:rPr lang="ko-KR" altLang="en-US"/>
               <a:t>마스터 제목 스타일 편집</a:t>
             </a:r>
-            <a:endParaRPr lang="ko-KR" altLang="en-US"/>
           </a:p>
         </p:txBody>
       </p:sp>
@@ -407,38 +422,37 @@
           <a:p>
             <a:pPr lvl="0"/>
             <a:r>
-              <a:rPr lang="ko-KR" altLang="en-US" smtClean="0"/>
+              <a:rPr lang="ko-KR" altLang="en-US"/>
               <a:t>마스터 텍스트 스타일을 편집합니다</a:t>
             </a:r>
           </a:p>
           <a:p>
             <a:pPr lvl="1"/>
             <a:r>
-              <a:rPr lang="ko-KR" altLang="en-US" smtClean="0"/>
+              <a:rPr lang="ko-KR" altLang="en-US"/>
               <a:t>둘째 수준</a:t>
             </a:r>
           </a:p>
           <a:p>
             <a:pPr lvl="2"/>
             <a:r>
-              <a:rPr lang="ko-KR" altLang="en-US" smtClean="0"/>
+              <a:rPr lang="ko-KR" altLang="en-US"/>
               <a:t>셋째 수준</a:t>
             </a:r>
           </a:p>
           <a:p>
             <a:pPr lvl="3"/>
             <a:r>
-              <a:rPr lang="ko-KR" altLang="en-US" smtClean="0"/>
+              <a:rPr lang="ko-KR" altLang="en-US"/>
               <a:t>넷째 수준</a:t>
             </a:r>
           </a:p>
           <a:p>
             <a:pPr lvl="4"/>
             <a:r>
-              <a:rPr lang="ko-KR" altLang="en-US" smtClean="0"/>
+              <a:rPr lang="ko-KR" altLang="en-US"/>
               <a:t>다섯째 수준</a:t>
             </a:r>
-            <a:endParaRPr lang="ko-KR" altLang="en-US"/>
           </a:p>
         </p:txBody>
       </p:sp>
@@ -459,7 +473,7 @@
           <a:p>
             <a:fld id="{5E8ADD9A-8404-4EFD-A151-495D085594E9}" type="datetimeFigureOut">
               <a:rPr lang="ko-KR" altLang="en-US" smtClean="0"/>
-              <a:t>2020-11-25</a:t>
+              <a:t>2021-01-31</a:t>
             </a:fld>
             <a:endParaRPr lang="ko-KR" altLang="en-US"/>
           </a:p>
@@ -558,10 +572,9 @@
           <a:lstStyle/>
           <a:p>
             <a:r>
-              <a:rPr lang="ko-KR" altLang="en-US" smtClean="0"/>
+              <a:rPr lang="ko-KR" altLang="en-US"/>
               <a:t>마스터 제목 스타일 편집</a:t>
             </a:r>
-            <a:endParaRPr lang="ko-KR" altLang="en-US"/>
           </a:p>
         </p:txBody>
       </p:sp>
@@ -587,38 +600,37 @@
           <a:p>
             <a:pPr lvl="0"/>
             <a:r>
-              <a:rPr lang="ko-KR" altLang="en-US" smtClean="0"/>
+              <a:rPr lang="ko-KR" altLang="en-US"/>
               <a:t>마스터 텍스트 스타일을 편집합니다</a:t>
             </a:r>
           </a:p>
           <a:p>
             <a:pPr lvl="1"/>
             <a:r>
-              <a:rPr lang="ko-KR" altLang="en-US" smtClean="0"/>
+              <a:rPr lang="ko-KR" altLang="en-US"/>
               <a:t>둘째 수준</a:t>
             </a:r>
           </a:p>
           <a:p>
             <a:pPr lvl="2"/>
             <a:r>
-              <a:rPr lang="ko-KR" altLang="en-US" smtClean="0"/>
+              <a:rPr lang="ko-KR" altLang="en-US"/>
               <a:t>셋째 수준</a:t>
             </a:r>
           </a:p>
           <a:p>
             <a:pPr lvl="3"/>
             <a:r>
-              <a:rPr lang="ko-KR" altLang="en-US" smtClean="0"/>
+              <a:rPr lang="ko-KR" altLang="en-US"/>
               <a:t>넷째 수준</a:t>
             </a:r>
           </a:p>
           <a:p>
             <a:pPr lvl="4"/>
             <a:r>
-              <a:rPr lang="ko-KR" altLang="en-US" smtClean="0"/>
+              <a:rPr lang="ko-KR" altLang="en-US"/>
               <a:t>다섯째 수준</a:t>
             </a:r>
-            <a:endParaRPr lang="ko-KR" altLang="en-US"/>
           </a:p>
         </p:txBody>
       </p:sp>
@@ -639,7 +651,7 @@
           <a:p>
             <a:fld id="{5E8ADD9A-8404-4EFD-A151-495D085594E9}" type="datetimeFigureOut">
               <a:rPr lang="ko-KR" altLang="en-US" smtClean="0"/>
-              <a:t>2020-11-25</a:t>
+              <a:t>2021-01-31</a:t>
             </a:fld>
             <a:endParaRPr lang="ko-KR" altLang="en-US"/>
           </a:p>
@@ -733,10 +745,9 @@
           <a:lstStyle/>
           <a:p>
             <a:r>
-              <a:rPr lang="ko-KR" altLang="en-US" smtClean="0"/>
+              <a:rPr lang="ko-KR" altLang="en-US"/>
               <a:t>마스터 제목 스타일 편집</a:t>
             </a:r>
-            <a:endParaRPr lang="ko-KR" altLang="en-US"/>
           </a:p>
         </p:txBody>
       </p:sp>
@@ -757,38 +768,37 @@
           <a:p>
             <a:pPr lvl="0"/>
             <a:r>
-              <a:rPr lang="ko-KR" altLang="en-US" smtClean="0"/>
+              <a:rPr lang="ko-KR" altLang="en-US"/>
               <a:t>마스터 텍스트 스타일을 편집합니다</a:t>
             </a:r>
           </a:p>
           <a:p>
             <a:pPr lvl="1"/>
             <a:r>
-              <a:rPr lang="ko-KR" altLang="en-US" smtClean="0"/>
+              <a:rPr lang="ko-KR" altLang="en-US"/>
               <a:t>둘째 수준</a:t>
             </a:r>
           </a:p>
           <a:p>
             <a:pPr lvl="2"/>
             <a:r>
-              <a:rPr lang="ko-KR" altLang="en-US" smtClean="0"/>
+              <a:rPr lang="ko-KR" altLang="en-US"/>
               <a:t>셋째 수준</a:t>
             </a:r>
           </a:p>
           <a:p>
             <a:pPr lvl="3"/>
             <a:r>
-              <a:rPr lang="ko-KR" altLang="en-US" smtClean="0"/>
+              <a:rPr lang="ko-KR" altLang="en-US"/>
               <a:t>넷째 수준</a:t>
             </a:r>
           </a:p>
           <a:p>
             <a:pPr lvl="4"/>
             <a:r>
-              <a:rPr lang="ko-KR" altLang="en-US" smtClean="0"/>
+              <a:rPr lang="ko-KR" altLang="en-US"/>
               <a:t>다섯째 수준</a:t>
             </a:r>
-            <a:endParaRPr lang="ko-KR" altLang="en-US"/>
           </a:p>
         </p:txBody>
       </p:sp>
@@ -809,7 +819,7 @@
           <a:p>
             <a:fld id="{5E8ADD9A-8404-4EFD-A151-495D085594E9}" type="datetimeFigureOut">
               <a:rPr lang="ko-KR" altLang="en-US" smtClean="0"/>
-              <a:t>2020-11-25</a:t>
+              <a:t>2021-01-31</a:t>
             </a:fld>
             <a:endParaRPr lang="ko-KR" altLang="en-US"/>
           </a:p>
@@ -912,10 +922,9 @@
           </a:lstStyle>
           <a:p>
             <a:r>
-              <a:rPr lang="ko-KR" altLang="en-US" smtClean="0"/>
+              <a:rPr lang="ko-KR" altLang="en-US"/>
               <a:t>마스터 제목 스타일 편집</a:t>
             </a:r>
-            <a:endParaRPr lang="ko-KR" altLang="en-US"/>
           </a:p>
         </p:txBody>
       </p:sp>
@@ -1032,7 +1041,7 @@
           <a:p>
             <a:pPr lvl="0"/>
             <a:r>
-              <a:rPr lang="ko-KR" altLang="en-US" smtClean="0"/>
+              <a:rPr lang="ko-KR" altLang="en-US"/>
               <a:t>마스터 텍스트 스타일을 편집합니다</a:t>
             </a:r>
           </a:p>
@@ -1055,7 +1064,7 @@
           <a:p>
             <a:fld id="{5E8ADD9A-8404-4EFD-A151-495D085594E9}" type="datetimeFigureOut">
               <a:rPr lang="ko-KR" altLang="en-US" smtClean="0"/>
-              <a:t>2020-11-25</a:t>
+              <a:t>2021-01-31</a:t>
             </a:fld>
             <a:endParaRPr lang="ko-KR" altLang="en-US"/>
           </a:p>
@@ -1149,10 +1158,9 @@
           <a:lstStyle/>
           <a:p>
             <a:r>
-              <a:rPr lang="ko-KR" altLang="en-US" smtClean="0"/>
+              <a:rPr lang="ko-KR" altLang="en-US"/>
               <a:t>마스터 제목 스타일 편집</a:t>
             </a:r>
-            <a:endParaRPr lang="ko-KR" altLang="en-US"/>
           </a:p>
         </p:txBody>
       </p:sp>
@@ -1206,38 +1214,37 @@
           <a:p>
             <a:pPr lvl="0"/>
             <a:r>
-              <a:rPr lang="ko-KR" altLang="en-US" smtClean="0"/>
+              <a:rPr lang="ko-KR" altLang="en-US"/>
               <a:t>마스터 텍스트 스타일을 편집합니다</a:t>
             </a:r>
           </a:p>
           <a:p>
             <a:pPr lvl="1"/>
             <a:r>
-              <a:rPr lang="ko-KR" altLang="en-US" smtClean="0"/>
+              <a:rPr lang="ko-KR" altLang="en-US"/>
               <a:t>둘째 수준</a:t>
             </a:r>
           </a:p>
           <a:p>
             <a:pPr lvl="2"/>
             <a:r>
-              <a:rPr lang="ko-KR" altLang="en-US" smtClean="0"/>
+              <a:rPr lang="ko-KR" altLang="en-US"/>
               <a:t>셋째 수준</a:t>
             </a:r>
           </a:p>
           <a:p>
             <a:pPr lvl="3"/>
             <a:r>
-              <a:rPr lang="ko-KR" altLang="en-US" smtClean="0"/>
+              <a:rPr lang="ko-KR" altLang="en-US"/>
               <a:t>넷째 수준</a:t>
             </a:r>
           </a:p>
           <a:p>
             <a:pPr lvl="4"/>
             <a:r>
-              <a:rPr lang="ko-KR" altLang="en-US" smtClean="0"/>
+              <a:rPr lang="ko-KR" altLang="en-US"/>
               <a:t>다섯째 수준</a:t>
             </a:r>
-            <a:endParaRPr lang="ko-KR" altLang="en-US"/>
           </a:p>
         </p:txBody>
       </p:sp>
@@ -1291,38 +1298,37 @@
           <a:p>
             <a:pPr lvl="0"/>
             <a:r>
-              <a:rPr lang="ko-KR" altLang="en-US" smtClean="0"/>
+              <a:rPr lang="ko-KR" altLang="en-US"/>
               <a:t>마스터 텍스트 스타일을 편집합니다</a:t>
             </a:r>
           </a:p>
           <a:p>
             <a:pPr lvl="1"/>
             <a:r>
-              <a:rPr lang="ko-KR" altLang="en-US" smtClean="0"/>
+              <a:rPr lang="ko-KR" altLang="en-US"/>
               <a:t>둘째 수준</a:t>
             </a:r>
           </a:p>
           <a:p>
             <a:pPr lvl="2"/>
             <a:r>
-              <a:rPr lang="ko-KR" altLang="en-US" smtClean="0"/>
+              <a:rPr lang="ko-KR" altLang="en-US"/>
               <a:t>셋째 수준</a:t>
             </a:r>
           </a:p>
           <a:p>
             <a:pPr lvl="3"/>
             <a:r>
-              <a:rPr lang="ko-KR" altLang="en-US" smtClean="0"/>
+              <a:rPr lang="ko-KR" altLang="en-US"/>
               <a:t>넷째 수준</a:t>
             </a:r>
           </a:p>
           <a:p>
             <a:pPr lvl="4"/>
             <a:r>
-              <a:rPr lang="ko-KR" altLang="en-US" smtClean="0"/>
+              <a:rPr lang="ko-KR" altLang="en-US"/>
               <a:t>다섯째 수준</a:t>
             </a:r>
-            <a:endParaRPr lang="ko-KR" altLang="en-US"/>
           </a:p>
         </p:txBody>
       </p:sp>
@@ -1343,7 +1349,7 @@
           <a:p>
             <a:fld id="{5E8ADD9A-8404-4EFD-A151-495D085594E9}" type="datetimeFigureOut">
               <a:rPr lang="ko-KR" altLang="en-US" smtClean="0"/>
-              <a:t>2020-11-25</a:t>
+              <a:t>2021-01-31</a:t>
             </a:fld>
             <a:endParaRPr lang="ko-KR" altLang="en-US"/>
           </a:p>
@@ -1441,10 +1447,9 @@
           </a:lstStyle>
           <a:p>
             <a:r>
-              <a:rPr lang="ko-KR" altLang="en-US" smtClean="0"/>
+              <a:rPr lang="ko-KR" altLang="en-US"/>
               <a:t>마스터 제목 스타일 편집</a:t>
             </a:r>
-            <a:endParaRPr lang="ko-KR" altLang="en-US"/>
           </a:p>
         </p:txBody>
       </p:sp>
@@ -1507,7 +1512,7 @@
           <a:p>
             <a:pPr lvl="0"/>
             <a:r>
-              <a:rPr lang="ko-KR" altLang="en-US" smtClean="0"/>
+              <a:rPr lang="ko-KR" altLang="en-US"/>
               <a:t>마스터 텍스트 스타일을 편집합니다</a:t>
             </a:r>
           </a:p>
@@ -1563,38 +1568,37 @@
           <a:p>
             <a:pPr lvl="0"/>
             <a:r>
-              <a:rPr lang="ko-KR" altLang="en-US" smtClean="0"/>
+              <a:rPr lang="ko-KR" altLang="en-US"/>
               <a:t>마스터 텍스트 스타일을 편집합니다</a:t>
             </a:r>
           </a:p>
           <a:p>
             <a:pPr lvl="1"/>
             <a:r>
-              <a:rPr lang="ko-KR" altLang="en-US" smtClean="0"/>
+              <a:rPr lang="ko-KR" altLang="en-US"/>
               <a:t>둘째 수준</a:t>
             </a:r>
           </a:p>
           <a:p>
             <a:pPr lvl="2"/>
             <a:r>
-              <a:rPr lang="ko-KR" altLang="en-US" smtClean="0"/>
+              <a:rPr lang="ko-KR" altLang="en-US"/>
               <a:t>셋째 수준</a:t>
             </a:r>
           </a:p>
           <a:p>
             <a:pPr lvl="3"/>
             <a:r>
-              <a:rPr lang="ko-KR" altLang="en-US" smtClean="0"/>
+              <a:rPr lang="ko-KR" altLang="en-US"/>
               <a:t>넷째 수준</a:t>
             </a:r>
           </a:p>
           <a:p>
             <a:pPr lvl="4"/>
             <a:r>
-              <a:rPr lang="ko-KR" altLang="en-US" smtClean="0"/>
+              <a:rPr lang="ko-KR" altLang="en-US"/>
               <a:t>다섯째 수준</a:t>
             </a:r>
-            <a:endParaRPr lang="ko-KR" altLang="en-US"/>
           </a:p>
         </p:txBody>
       </p:sp>
@@ -1657,7 +1661,7 @@
           <a:p>
             <a:pPr lvl="0"/>
             <a:r>
-              <a:rPr lang="ko-KR" altLang="en-US" smtClean="0"/>
+              <a:rPr lang="ko-KR" altLang="en-US"/>
               <a:t>마스터 텍스트 스타일을 편집합니다</a:t>
             </a:r>
           </a:p>
@@ -1713,38 +1717,37 @@
           <a:p>
             <a:pPr lvl="0"/>
             <a:r>
-              <a:rPr lang="ko-KR" altLang="en-US" smtClean="0"/>
+              <a:rPr lang="ko-KR" altLang="en-US"/>
               <a:t>마스터 텍스트 스타일을 편집합니다</a:t>
             </a:r>
           </a:p>
           <a:p>
             <a:pPr lvl="1"/>
             <a:r>
-              <a:rPr lang="ko-KR" altLang="en-US" smtClean="0"/>
+              <a:rPr lang="ko-KR" altLang="en-US"/>
               <a:t>둘째 수준</a:t>
             </a:r>
           </a:p>
           <a:p>
             <a:pPr lvl="2"/>
             <a:r>
-              <a:rPr lang="ko-KR" altLang="en-US" smtClean="0"/>
+              <a:rPr lang="ko-KR" altLang="en-US"/>
               <a:t>셋째 수준</a:t>
             </a:r>
           </a:p>
           <a:p>
             <a:pPr lvl="3"/>
             <a:r>
-              <a:rPr lang="ko-KR" altLang="en-US" smtClean="0"/>
+              <a:rPr lang="ko-KR" altLang="en-US"/>
               <a:t>넷째 수준</a:t>
             </a:r>
           </a:p>
           <a:p>
             <a:pPr lvl="4"/>
             <a:r>
-              <a:rPr lang="ko-KR" altLang="en-US" smtClean="0"/>
+              <a:rPr lang="ko-KR" altLang="en-US"/>
               <a:t>다섯째 수준</a:t>
             </a:r>
-            <a:endParaRPr lang="ko-KR" altLang="en-US"/>
           </a:p>
         </p:txBody>
       </p:sp>
@@ -1765,7 +1768,7 @@
           <a:p>
             <a:fld id="{5E8ADD9A-8404-4EFD-A151-495D085594E9}" type="datetimeFigureOut">
               <a:rPr lang="ko-KR" altLang="en-US" smtClean="0"/>
-              <a:t>2020-11-25</a:t>
+              <a:t>2021-01-31</a:t>
             </a:fld>
             <a:endParaRPr lang="ko-KR" altLang="en-US"/>
           </a:p>
@@ -1859,10 +1862,9 @@
           <a:lstStyle/>
           <a:p>
             <a:r>
-              <a:rPr lang="ko-KR" altLang="en-US" smtClean="0"/>
+              <a:rPr lang="ko-KR" altLang="en-US"/>
               <a:t>마스터 제목 스타일 편집</a:t>
             </a:r>
-            <a:endParaRPr lang="ko-KR" altLang="en-US"/>
           </a:p>
         </p:txBody>
       </p:sp>
@@ -1883,7 +1885,7 @@
           <a:p>
             <a:fld id="{5E8ADD9A-8404-4EFD-A151-495D085594E9}" type="datetimeFigureOut">
               <a:rPr lang="ko-KR" altLang="en-US" smtClean="0"/>
-              <a:t>2020-11-25</a:t>
+              <a:t>2021-01-31</a:t>
             </a:fld>
             <a:endParaRPr lang="ko-KR" altLang="en-US"/>
           </a:p>
@@ -1978,7 +1980,7 @@
           <a:p>
             <a:fld id="{5E8ADD9A-8404-4EFD-A151-495D085594E9}" type="datetimeFigureOut">
               <a:rPr lang="ko-KR" altLang="en-US" smtClean="0"/>
-              <a:t>2020-11-25</a:t>
+              <a:t>2021-01-31</a:t>
             </a:fld>
             <a:endParaRPr lang="ko-KR" altLang="en-US"/>
           </a:p>
@@ -2081,10 +2083,9 @@
           </a:lstStyle>
           <a:p>
             <a:r>
-              <a:rPr lang="ko-KR" altLang="en-US" smtClean="0"/>
+              <a:rPr lang="ko-KR" altLang="en-US"/>
               <a:t>마스터 제목 스타일 편집</a:t>
             </a:r>
-            <a:endParaRPr lang="ko-KR" altLang="en-US"/>
           </a:p>
         </p:txBody>
       </p:sp>
@@ -2138,38 +2139,37 @@
           <a:p>
             <a:pPr lvl="0"/>
             <a:r>
-              <a:rPr lang="ko-KR" altLang="en-US" smtClean="0"/>
+              <a:rPr lang="ko-KR" altLang="en-US"/>
               <a:t>마스터 텍스트 스타일을 편집합니다</a:t>
             </a:r>
           </a:p>
           <a:p>
             <a:pPr lvl="1"/>
             <a:r>
-              <a:rPr lang="ko-KR" altLang="en-US" smtClean="0"/>
+              <a:rPr lang="ko-KR" altLang="en-US"/>
               <a:t>둘째 수준</a:t>
             </a:r>
           </a:p>
           <a:p>
             <a:pPr lvl="2"/>
             <a:r>
-              <a:rPr lang="ko-KR" altLang="en-US" smtClean="0"/>
+              <a:rPr lang="ko-KR" altLang="en-US"/>
               <a:t>셋째 수준</a:t>
             </a:r>
           </a:p>
           <a:p>
             <a:pPr lvl="3"/>
             <a:r>
-              <a:rPr lang="ko-KR" altLang="en-US" smtClean="0"/>
+              <a:rPr lang="ko-KR" altLang="en-US"/>
               <a:t>넷째 수준</a:t>
             </a:r>
           </a:p>
           <a:p>
             <a:pPr lvl="4"/>
             <a:r>
-              <a:rPr lang="ko-KR" altLang="en-US" smtClean="0"/>
+              <a:rPr lang="ko-KR" altLang="en-US"/>
               <a:t>다섯째 수준</a:t>
             </a:r>
-            <a:endParaRPr lang="ko-KR" altLang="en-US"/>
           </a:p>
         </p:txBody>
       </p:sp>
@@ -2232,7 +2232,7 @@
           <a:p>
             <a:pPr lvl="0"/>
             <a:r>
-              <a:rPr lang="ko-KR" altLang="en-US" smtClean="0"/>
+              <a:rPr lang="ko-KR" altLang="en-US"/>
               <a:t>마스터 텍스트 스타일을 편집합니다</a:t>
             </a:r>
           </a:p>
@@ -2255,7 +2255,7 @@
           <a:p>
             <a:fld id="{5E8ADD9A-8404-4EFD-A151-495D085594E9}" type="datetimeFigureOut">
               <a:rPr lang="ko-KR" altLang="en-US" smtClean="0"/>
-              <a:t>2020-11-25</a:t>
+              <a:t>2021-01-31</a:t>
             </a:fld>
             <a:endParaRPr lang="ko-KR" altLang="en-US"/>
           </a:p>
@@ -2358,10 +2358,9 @@
           </a:lstStyle>
           <a:p>
             <a:r>
-              <a:rPr lang="ko-KR" altLang="en-US" smtClean="0"/>
+              <a:rPr lang="ko-KR" altLang="en-US"/>
               <a:t>마스터 제목 스타일 편집</a:t>
             </a:r>
-            <a:endParaRPr lang="ko-KR" altLang="en-US"/>
           </a:p>
         </p:txBody>
       </p:sp>
@@ -2485,7 +2484,7 @@
           <a:p>
             <a:pPr lvl="0"/>
             <a:r>
-              <a:rPr lang="ko-KR" altLang="en-US" smtClean="0"/>
+              <a:rPr lang="ko-KR" altLang="en-US"/>
               <a:t>마스터 텍스트 스타일을 편집합니다</a:t>
             </a:r>
           </a:p>
@@ -2508,7 +2507,7 @@
           <a:p>
             <a:fld id="{5E8ADD9A-8404-4EFD-A151-495D085594E9}" type="datetimeFigureOut">
               <a:rPr lang="ko-KR" altLang="en-US" smtClean="0"/>
-              <a:t>2020-11-25</a:t>
+              <a:t>2021-01-31</a:t>
             </a:fld>
             <a:endParaRPr lang="ko-KR" altLang="en-US"/>
           </a:p>
@@ -2617,10 +2616,9 @@
           <a:lstStyle/>
           <a:p>
             <a:r>
-              <a:rPr lang="ko-KR" altLang="en-US" smtClean="0"/>
+              <a:rPr lang="ko-KR" altLang="en-US"/>
               <a:t>마스터 제목 스타일 편집</a:t>
             </a:r>
-            <a:endParaRPr lang="ko-KR" altLang="en-US"/>
           </a:p>
         </p:txBody>
       </p:sp>
@@ -2651,38 +2649,37 @@
           <a:p>
             <a:pPr lvl="0"/>
             <a:r>
-              <a:rPr lang="ko-KR" altLang="en-US" smtClean="0"/>
+              <a:rPr lang="ko-KR" altLang="en-US"/>
               <a:t>마스터 텍스트 스타일을 편집합니다</a:t>
             </a:r>
           </a:p>
           <a:p>
             <a:pPr lvl="1"/>
             <a:r>
-              <a:rPr lang="ko-KR" altLang="en-US" smtClean="0"/>
+              <a:rPr lang="ko-KR" altLang="en-US"/>
               <a:t>둘째 수준</a:t>
             </a:r>
           </a:p>
           <a:p>
             <a:pPr lvl="2"/>
             <a:r>
-              <a:rPr lang="ko-KR" altLang="en-US" smtClean="0"/>
+              <a:rPr lang="ko-KR" altLang="en-US"/>
               <a:t>셋째 수준</a:t>
             </a:r>
           </a:p>
           <a:p>
             <a:pPr lvl="3"/>
             <a:r>
-              <a:rPr lang="ko-KR" altLang="en-US" smtClean="0"/>
+              <a:rPr lang="ko-KR" altLang="en-US"/>
               <a:t>넷째 수준</a:t>
             </a:r>
           </a:p>
           <a:p>
             <a:pPr lvl="4"/>
             <a:r>
-              <a:rPr lang="ko-KR" altLang="en-US" smtClean="0"/>
+              <a:rPr lang="ko-KR" altLang="en-US"/>
               <a:t>다섯째 수준</a:t>
             </a:r>
-            <a:endParaRPr lang="ko-KR" altLang="en-US"/>
           </a:p>
         </p:txBody>
       </p:sp>
@@ -2721,7 +2718,7 @@
           <a:p>
             <a:fld id="{5E8ADD9A-8404-4EFD-A151-495D085594E9}" type="datetimeFigureOut">
               <a:rPr lang="ko-KR" altLang="en-US" smtClean="0"/>
-              <a:t>2020-11-25</a:t>
+              <a:t>2021-01-31</a:t>
             </a:fld>
             <a:endParaRPr lang="ko-KR" altLang="en-US"/>
           </a:p>
@@ -3098,6 +3095,2294 @@
       </p:grpSpPr>
       <p:sp>
         <p:nvSpPr>
+          <p:cNvPr id="13" name="원호 12">
+            <a:extLst>
+              <a:ext uri="{FF2B5EF4-FFF2-40B4-BE49-F238E27FC236}">
+                <a16:creationId xmlns:a16="http://schemas.microsoft.com/office/drawing/2014/main" id="{888DF389-40DF-44D4-9804-A162E620F3E1}"/>
+              </a:ext>
+            </a:extLst>
+          </p:cNvPr>
+          <p:cNvSpPr/>
+          <p:nvPr/>
+        </p:nvSpPr>
+        <p:spPr>
+          <a:xfrm>
+            <a:off x="2489853" y="4937662"/>
+            <a:ext cx="1427989" cy="1427989"/>
+          </a:xfrm>
+          <a:prstGeom prst="arc">
+            <a:avLst>
+              <a:gd name="adj1" fmla="val 17125588"/>
+              <a:gd name="adj2" fmla="val 19622520"/>
+            </a:avLst>
+          </a:prstGeom>
+          <a:ln>
+            <a:solidFill>
+              <a:schemeClr val="tx1"/>
+            </a:solidFill>
+            <a:prstDash val="dash"/>
+          </a:ln>
+        </p:spPr>
+        <p:style>
+          <a:lnRef idx="1">
+            <a:schemeClr val="accent1"/>
+          </a:lnRef>
+          <a:fillRef idx="0">
+            <a:schemeClr val="accent1"/>
+          </a:fillRef>
+          <a:effectRef idx="0">
+            <a:schemeClr val="accent1"/>
+          </a:effectRef>
+          <a:fontRef idx="minor">
+            <a:schemeClr val="tx1"/>
+          </a:fontRef>
+        </p:style>
+        <p:txBody>
+          <a:bodyPr rtlCol="0" anchor="ctr"/>
+          <a:lstStyle/>
+          <a:p>
+            <a:pPr algn="ctr"/>
+            <a:endParaRPr lang="ko-KR" altLang="en-US"/>
+          </a:p>
+        </p:txBody>
+      </p:sp>
+      <p:cxnSp>
+        <p:nvCxnSpPr>
+          <p:cNvPr id="6" name="직선 화살표 연결선 5">
+            <a:extLst>
+              <a:ext uri="{FF2B5EF4-FFF2-40B4-BE49-F238E27FC236}">
+                <a16:creationId xmlns:a16="http://schemas.microsoft.com/office/drawing/2014/main" id="{41871895-115B-4C2D-8AA2-35A27E339D32}"/>
+              </a:ext>
+            </a:extLst>
+          </p:cNvPr>
+          <p:cNvCxnSpPr>
+            <a:cxnSpLocks/>
+          </p:cNvCxnSpPr>
+          <p:nvPr/>
+        </p:nvCxnSpPr>
+        <p:spPr>
+          <a:xfrm flipV="1">
+            <a:off x="3203848" y="1296098"/>
+            <a:ext cx="4607188" cy="4534057"/>
+          </a:xfrm>
+          <a:prstGeom prst="straightConnector1">
+            <a:avLst/>
+          </a:prstGeom>
+          <a:ln w="57150">
+            <a:solidFill>
+              <a:schemeClr val="tx1"/>
+            </a:solidFill>
+            <a:tailEnd type="triangle"/>
+          </a:ln>
+        </p:spPr>
+        <p:style>
+          <a:lnRef idx="1">
+            <a:schemeClr val="accent1"/>
+          </a:lnRef>
+          <a:fillRef idx="0">
+            <a:schemeClr val="accent1"/>
+          </a:fillRef>
+          <a:effectRef idx="0">
+            <a:schemeClr val="accent1"/>
+          </a:effectRef>
+          <a:fontRef idx="minor">
+            <a:schemeClr val="tx1"/>
+          </a:fontRef>
+        </p:style>
+      </p:cxnSp>
+      <p:cxnSp>
+        <p:nvCxnSpPr>
+          <p:cNvPr id="10" name="직선 연결선 9">
+            <a:extLst>
+              <a:ext uri="{FF2B5EF4-FFF2-40B4-BE49-F238E27FC236}">
+                <a16:creationId xmlns:a16="http://schemas.microsoft.com/office/drawing/2014/main" id="{A9909453-2E4A-47E9-BF6C-31F5730E0AA2}"/>
+              </a:ext>
+            </a:extLst>
+          </p:cNvPr>
+          <p:cNvCxnSpPr>
+            <a:cxnSpLocks/>
+          </p:cNvCxnSpPr>
+          <p:nvPr/>
+        </p:nvCxnSpPr>
+        <p:spPr>
+          <a:xfrm>
+            <a:off x="4154767" y="980728"/>
+            <a:ext cx="1947603" cy="1947603"/>
+          </a:xfrm>
+          <a:prstGeom prst="line">
+            <a:avLst/>
+          </a:prstGeom>
+          <a:ln>
+            <a:solidFill>
+              <a:schemeClr val="tx1"/>
+            </a:solidFill>
+            <a:prstDash val="dash"/>
+          </a:ln>
+        </p:spPr>
+        <p:style>
+          <a:lnRef idx="1">
+            <a:schemeClr val="accent1"/>
+          </a:lnRef>
+          <a:fillRef idx="0">
+            <a:schemeClr val="accent1"/>
+          </a:fillRef>
+          <a:effectRef idx="0">
+            <a:schemeClr val="accent1"/>
+          </a:effectRef>
+          <a:fontRef idx="minor">
+            <a:schemeClr val="tx1"/>
+          </a:fontRef>
+        </p:style>
+      </p:cxnSp>
+      <p:cxnSp>
+        <p:nvCxnSpPr>
+          <p:cNvPr id="11" name="직선 화살표 연결선 10">
+            <a:extLst>
+              <a:ext uri="{FF2B5EF4-FFF2-40B4-BE49-F238E27FC236}">
+                <a16:creationId xmlns:a16="http://schemas.microsoft.com/office/drawing/2014/main" id="{E11BA27E-F99C-44A9-8E1C-71DC2258D47E}"/>
+              </a:ext>
+            </a:extLst>
+          </p:cNvPr>
+          <p:cNvCxnSpPr>
+            <a:cxnSpLocks/>
+          </p:cNvCxnSpPr>
+          <p:nvPr/>
+        </p:nvCxnSpPr>
+        <p:spPr>
+          <a:xfrm flipV="1">
+            <a:off x="3216548" y="2968267"/>
+            <a:ext cx="2908048" cy="2861889"/>
+          </a:xfrm>
+          <a:prstGeom prst="straightConnector1">
+            <a:avLst/>
+          </a:prstGeom>
+          <a:ln w="76200">
+            <a:solidFill>
+              <a:srgbClr val="FF0000"/>
+            </a:solidFill>
+            <a:headEnd type="none" w="med" len="med"/>
+            <a:tailEnd type="none" w="med" len="med"/>
+          </a:ln>
+        </p:spPr>
+        <p:style>
+          <a:lnRef idx="1">
+            <a:schemeClr val="accent1"/>
+          </a:lnRef>
+          <a:fillRef idx="0">
+            <a:schemeClr val="accent1"/>
+          </a:fillRef>
+          <a:effectRef idx="0">
+            <a:schemeClr val="accent1"/>
+          </a:effectRef>
+          <a:fontRef idx="minor">
+            <a:schemeClr val="tx1"/>
+          </a:fontRef>
+        </p:style>
+      </p:cxnSp>
+      <mc:AlternateContent xmlns:mc="http://schemas.openxmlformats.org/markup-compatibility/2006">
+        <mc:Choice xmlns:a14="http://schemas.microsoft.com/office/drawing/2010/main" Requires="a14">
+          <p:sp>
+            <p:nvSpPr>
+              <p:cNvPr id="14" name="TextBox 13">
+                <a:extLst>
+                  <a:ext uri="{FF2B5EF4-FFF2-40B4-BE49-F238E27FC236}">
+                    <a16:creationId xmlns:a16="http://schemas.microsoft.com/office/drawing/2014/main" id="{F845D679-1B65-4B49-A4EA-166A9898B0D1}"/>
+                  </a:ext>
+                </a:extLst>
+              </p:cNvPr>
+              <p:cNvSpPr txBox="1"/>
+              <p:nvPr/>
+            </p:nvSpPr>
+            <p:spPr>
+              <a:xfrm>
+                <a:off x="3447206" y="4521579"/>
+                <a:ext cx="571823" cy="584775"/>
+              </a:xfrm>
+              <a:prstGeom prst="rect">
+                <a:avLst/>
+              </a:prstGeom>
+              <a:noFill/>
+            </p:spPr>
+            <p:txBody>
+              <a:bodyPr wrap="none" rtlCol="0">
+                <a:spAutoFit/>
+              </a:bodyPr>
+              <a:lstStyle/>
+              <a:p>
+                <a14:m>
+                  <m:oMathPara xmlns:m="http://schemas.openxmlformats.org/officeDocument/2006/math">
+                    <m:oMathParaPr>
+                      <m:jc m:val="centerGroup"/>
+                    </m:oMathParaPr>
+                    <m:oMath xmlns:m="http://schemas.openxmlformats.org/officeDocument/2006/math">
+                      <m:r>
+                        <a:rPr lang="en-US" altLang="ko-KR" sz="3200" b="0" i="1" smtClean="0">
+                          <a:latin typeface="Cambria Math" panose="02040503050406030204" pitchFamily="18" charset="0"/>
+                        </a:rPr>
+                        <m:t>𝜃</m:t>
+                      </m:r>
+                    </m:oMath>
+                  </m:oMathPara>
+                </a14:m>
+                <a:endParaRPr lang="ko-KR" altLang="en-US" sz="3200" dirty="0"/>
+              </a:p>
+            </p:txBody>
+          </p:sp>
+        </mc:Choice>
+        <mc:Fallback>
+          <p:sp>
+            <p:nvSpPr>
+              <p:cNvPr id="14" name="TextBox 13">
+                <a:extLst>
+                  <a:ext uri="{FF2B5EF4-FFF2-40B4-BE49-F238E27FC236}">
+                    <a16:creationId xmlns:a16="http://schemas.microsoft.com/office/drawing/2014/main" id="{F845D679-1B65-4B49-A4EA-166A9898B0D1}"/>
+                  </a:ext>
+                </a:extLst>
+              </p:cNvPr>
+              <p:cNvSpPr txBox="1">
+                <a:spLocks noRot="1" noChangeAspect="1" noMove="1" noResize="1" noEditPoints="1" noAdjustHandles="1" noChangeArrowheads="1" noChangeShapeType="1" noTextEdit="1"/>
+              </p:cNvSpPr>
+              <p:nvPr/>
+            </p:nvSpPr>
+            <p:spPr>
+              <a:xfrm>
+                <a:off x="3447206" y="4521579"/>
+                <a:ext cx="571823" cy="584775"/>
+              </a:xfrm>
+              <a:prstGeom prst="rect">
+                <a:avLst/>
+              </a:prstGeom>
+              <a:blipFill>
+                <a:blip r:embed="rId2"/>
+                <a:stretch>
+                  <a:fillRect/>
+                </a:stretch>
+              </a:blipFill>
+            </p:spPr>
+            <p:txBody>
+              <a:bodyPr/>
+              <a:lstStyle/>
+              <a:p>
+                <a:r>
+                  <a:rPr lang="ko-KR" altLang="en-US">
+                    <a:noFill/>
+                  </a:rPr>
+                  <a:t> </a:t>
+                </a:r>
+              </a:p>
+            </p:txBody>
+          </p:sp>
+        </mc:Fallback>
+      </mc:AlternateContent>
+      <mc:AlternateContent xmlns:mc="http://schemas.openxmlformats.org/markup-compatibility/2006">
+        <mc:Choice xmlns:a14="http://schemas.microsoft.com/office/drawing/2010/main" Requires="a14">
+          <p:sp>
+            <p:nvSpPr>
+              <p:cNvPr id="16" name="TextBox 15">
+                <a:extLst>
+                  <a:ext uri="{FF2B5EF4-FFF2-40B4-BE49-F238E27FC236}">
+                    <a16:creationId xmlns:a16="http://schemas.microsoft.com/office/drawing/2014/main" id="{DC8C783C-A7A5-40AB-958D-D307F63BE019}"/>
+                  </a:ext>
+                </a:extLst>
+              </p:cNvPr>
+              <p:cNvSpPr txBox="1"/>
+              <p:nvPr/>
+            </p:nvSpPr>
+            <p:spPr>
+              <a:xfrm>
+                <a:off x="3497965" y="776629"/>
+                <a:ext cx="559191" cy="657681"/>
+              </a:xfrm>
+              <a:prstGeom prst="rect">
+                <a:avLst/>
+              </a:prstGeom>
+              <a:noFill/>
+            </p:spPr>
+            <p:txBody>
+              <a:bodyPr wrap="none" rtlCol="0">
+                <a:spAutoFit/>
+              </a:bodyPr>
+              <a:lstStyle/>
+              <a:p>
+                <a14:m>
+                  <m:oMathPara xmlns:m="http://schemas.openxmlformats.org/officeDocument/2006/math">
+                    <m:oMathParaPr>
+                      <m:jc m:val="centerGroup"/>
+                    </m:oMathParaPr>
+                    <m:oMath xmlns:m="http://schemas.openxmlformats.org/officeDocument/2006/math">
+                      <m:acc>
+                        <m:accPr>
+                          <m:chr m:val="⃗"/>
+                          <m:ctrlPr>
+                            <a:rPr lang="en-US" altLang="ko-KR" sz="3200" b="0" i="1" smtClean="0">
+                              <a:latin typeface="Cambria Math" panose="02040503050406030204" pitchFamily="18" charset="0"/>
+                            </a:rPr>
+                          </m:ctrlPr>
+                        </m:accPr>
+                        <m:e>
+                          <m:r>
+                            <a:rPr lang="en-US" altLang="ko-KR" sz="3200" b="0" i="1" smtClean="0">
+                              <a:latin typeface="Cambria Math" panose="02040503050406030204" pitchFamily="18" charset="0"/>
+                            </a:rPr>
+                            <m:t>𝑏</m:t>
+                          </m:r>
+                        </m:e>
+                      </m:acc>
+                    </m:oMath>
+                  </m:oMathPara>
+                </a14:m>
+                <a:endParaRPr lang="ko-KR" altLang="en-US" sz="3200" dirty="0"/>
+              </a:p>
+            </p:txBody>
+          </p:sp>
+        </mc:Choice>
+        <mc:Fallback>
+          <p:sp>
+            <p:nvSpPr>
+              <p:cNvPr id="16" name="TextBox 15">
+                <a:extLst>
+                  <a:ext uri="{FF2B5EF4-FFF2-40B4-BE49-F238E27FC236}">
+                    <a16:creationId xmlns:a16="http://schemas.microsoft.com/office/drawing/2014/main" id="{DC8C783C-A7A5-40AB-958D-D307F63BE019}"/>
+                  </a:ext>
+                </a:extLst>
+              </p:cNvPr>
+              <p:cNvSpPr txBox="1">
+                <a:spLocks noRot="1" noChangeAspect="1" noMove="1" noResize="1" noEditPoints="1" noAdjustHandles="1" noChangeArrowheads="1" noChangeShapeType="1" noTextEdit="1"/>
+              </p:cNvSpPr>
+              <p:nvPr/>
+            </p:nvSpPr>
+            <p:spPr>
+              <a:xfrm>
+                <a:off x="3497965" y="776629"/>
+                <a:ext cx="559191" cy="657681"/>
+              </a:xfrm>
+              <a:prstGeom prst="rect">
+                <a:avLst/>
+              </a:prstGeom>
+              <a:blipFill>
+                <a:blip r:embed="rId3"/>
+                <a:stretch>
+                  <a:fillRect/>
+                </a:stretch>
+              </a:blipFill>
+            </p:spPr>
+            <p:txBody>
+              <a:bodyPr/>
+              <a:lstStyle/>
+              <a:p>
+                <a:r>
+                  <a:rPr lang="ko-KR" altLang="en-US">
+                    <a:noFill/>
+                  </a:rPr>
+                  <a:t> </a:t>
+                </a:r>
+              </a:p>
+            </p:txBody>
+          </p:sp>
+        </mc:Fallback>
+      </mc:AlternateContent>
+      <mc:AlternateContent xmlns:mc="http://schemas.openxmlformats.org/markup-compatibility/2006">
+        <mc:Choice xmlns:a14="http://schemas.microsoft.com/office/drawing/2010/main" Requires="a14">
+          <p:sp>
+            <p:nvSpPr>
+              <p:cNvPr id="17" name="TextBox 16">
+                <a:extLst>
+                  <a:ext uri="{FF2B5EF4-FFF2-40B4-BE49-F238E27FC236}">
+                    <a16:creationId xmlns:a16="http://schemas.microsoft.com/office/drawing/2014/main" id="{AC074638-91A2-427E-82A2-58A17708AF61}"/>
+                  </a:ext>
+                </a:extLst>
+              </p:cNvPr>
+              <p:cNvSpPr txBox="1"/>
+              <p:nvPr/>
+            </p:nvSpPr>
+            <p:spPr>
+              <a:xfrm>
+                <a:off x="7828591" y="1099941"/>
+                <a:ext cx="568169" cy="584775"/>
+              </a:xfrm>
+              <a:prstGeom prst="rect">
+                <a:avLst/>
+              </a:prstGeom>
+              <a:noFill/>
+            </p:spPr>
+            <p:txBody>
+              <a:bodyPr wrap="none" rtlCol="0">
+                <a:spAutoFit/>
+              </a:bodyPr>
+              <a:lstStyle/>
+              <a:p>
+                <a14:m>
+                  <m:oMathPara xmlns:m="http://schemas.openxmlformats.org/officeDocument/2006/math">
+                    <m:oMathParaPr>
+                      <m:jc m:val="centerGroup"/>
+                    </m:oMathParaPr>
+                    <m:oMath xmlns:m="http://schemas.openxmlformats.org/officeDocument/2006/math">
+                      <m:acc>
+                        <m:accPr>
+                          <m:chr m:val="⃗"/>
+                          <m:ctrlPr>
+                            <a:rPr lang="en-US" altLang="ko-KR" sz="3200" b="0" i="1" smtClean="0">
+                              <a:latin typeface="Cambria Math" panose="02040503050406030204" pitchFamily="18" charset="0"/>
+                            </a:rPr>
+                          </m:ctrlPr>
+                        </m:accPr>
+                        <m:e>
+                          <m:r>
+                            <a:rPr lang="en-US" altLang="ko-KR" sz="3200" b="0" i="1" smtClean="0">
+                              <a:latin typeface="Cambria Math" panose="02040503050406030204" pitchFamily="18" charset="0"/>
+                            </a:rPr>
+                            <m:t>𝑎</m:t>
+                          </m:r>
+                        </m:e>
+                      </m:acc>
+                    </m:oMath>
+                  </m:oMathPara>
+                </a14:m>
+                <a:endParaRPr lang="ko-KR" altLang="en-US" sz="3200" dirty="0"/>
+              </a:p>
+            </p:txBody>
+          </p:sp>
+        </mc:Choice>
+        <mc:Fallback>
+          <p:sp>
+            <p:nvSpPr>
+              <p:cNvPr id="17" name="TextBox 16">
+                <a:extLst>
+                  <a:ext uri="{FF2B5EF4-FFF2-40B4-BE49-F238E27FC236}">
+                    <a16:creationId xmlns:a16="http://schemas.microsoft.com/office/drawing/2014/main" id="{AC074638-91A2-427E-82A2-58A17708AF61}"/>
+                  </a:ext>
+                </a:extLst>
+              </p:cNvPr>
+              <p:cNvSpPr txBox="1">
+                <a:spLocks noRot="1" noChangeAspect="1" noMove="1" noResize="1" noEditPoints="1" noAdjustHandles="1" noChangeArrowheads="1" noChangeShapeType="1" noTextEdit="1"/>
+              </p:cNvSpPr>
+              <p:nvPr/>
+            </p:nvSpPr>
+            <p:spPr>
+              <a:xfrm>
+                <a:off x="7828591" y="1099941"/>
+                <a:ext cx="568169" cy="584775"/>
+              </a:xfrm>
+              <a:prstGeom prst="rect">
+                <a:avLst/>
+              </a:prstGeom>
+              <a:blipFill>
+                <a:blip r:embed="rId4"/>
+                <a:stretch>
+                  <a:fillRect/>
+                </a:stretch>
+              </a:blipFill>
+            </p:spPr>
+            <p:txBody>
+              <a:bodyPr/>
+              <a:lstStyle/>
+              <a:p>
+                <a:r>
+                  <a:rPr lang="ko-KR" altLang="en-US">
+                    <a:noFill/>
+                  </a:rPr>
+                  <a:t> </a:t>
+                </a:r>
+              </a:p>
+            </p:txBody>
+          </p:sp>
+        </mc:Fallback>
+      </mc:AlternateContent>
+      <p:cxnSp>
+        <p:nvCxnSpPr>
+          <p:cNvPr id="24" name="직선 연결선 23">
+            <a:extLst>
+              <a:ext uri="{FF2B5EF4-FFF2-40B4-BE49-F238E27FC236}">
+                <a16:creationId xmlns:a16="http://schemas.microsoft.com/office/drawing/2014/main" id="{22BDED62-7F2B-4B1A-90BE-2E4369F8A961}"/>
+              </a:ext>
+            </a:extLst>
+          </p:cNvPr>
+          <p:cNvCxnSpPr>
+            <a:cxnSpLocks/>
+          </p:cNvCxnSpPr>
+          <p:nvPr/>
+        </p:nvCxnSpPr>
+        <p:spPr>
+          <a:xfrm>
+            <a:off x="1246708" y="3833825"/>
+            <a:ext cx="1996330" cy="1996330"/>
+          </a:xfrm>
+          <a:prstGeom prst="line">
+            <a:avLst/>
+          </a:prstGeom>
+          <a:ln>
+            <a:solidFill>
+              <a:schemeClr val="tx1"/>
+            </a:solidFill>
+            <a:prstDash val="dash"/>
+          </a:ln>
+        </p:spPr>
+        <p:style>
+          <a:lnRef idx="1">
+            <a:schemeClr val="accent1"/>
+          </a:lnRef>
+          <a:fillRef idx="0">
+            <a:schemeClr val="accent1"/>
+          </a:fillRef>
+          <a:effectRef idx="0">
+            <a:schemeClr val="accent1"/>
+          </a:effectRef>
+          <a:fontRef idx="minor">
+            <a:schemeClr val="tx1"/>
+          </a:fontRef>
+        </p:style>
+      </p:cxnSp>
+      <p:cxnSp>
+        <p:nvCxnSpPr>
+          <p:cNvPr id="25" name="직선 화살표 연결선 24">
+            <a:extLst>
+              <a:ext uri="{FF2B5EF4-FFF2-40B4-BE49-F238E27FC236}">
+                <a16:creationId xmlns:a16="http://schemas.microsoft.com/office/drawing/2014/main" id="{DEC2B096-5976-46F7-AE8F-EFB24C3C3A4D}"/>
+              </a:ext>
+            </a:extLst>
+          </p:cNvPr>
+          <p:cNvCxnSpPr>
+            <a:cxnSpLocks/>
+          </p:cNvCxnSpPr>
+          <p:nvPr/>
+        </p:nvCxnSpPr>
+        <p:spPr>
+          <a:xfrm flipV="1">
+            <a:off x="1241957" y="971936"/>
+            <a:ext cx="2908048" cy="2861889"/>
+          </a:xfrm>
+          <a:prstGeom prst="straightConnector1">
+            <a:avLst/>
+          </a:prstGeom>
+          <a:ln w="9525">
+            <a:solidFill>
+              <a:schemeClr val="tx1"/>
+            </a:solidFill>
+            <a:prstDash val="sysDash"/>
+            <a:headEnd type="none" w="med" len="med"/>
+            <a:tailEnd type="none" w="med" len="med"/>
+          </a:ln>
+        </p:spPr>
+        <p:style>
+          <a:lnRef idx="1">
+            <a:schemeClr val="accent1"/>
+          </a:lnRef>
+          <a:fillRef idx="0">
+            <a:schemeClr val="accent1"/>
+          </a:fillRef>
+          <a:effectRef idx="0">
+            <a:schemeClr val="accent1"/>
+          </a:effectRef>
+          <a:fontRef idx="minor">
+            <a:schemeClr val="tx1"/>
+          </a:fontRef>
+        </p:style>
+      </p:cxnSp>
+      <p:cxnSp>
+        <p:nvCxnSpPr>
+          <p:cNvPr id="5" name="직선 화살표 연결선 4">
+            <a:extLst>
+              <a:ext uri="{FF2B5EF4-FFF2-40B4-BE49-F238E27FC236}">
+                <a16:creationId xmlns:a16="http://schemas.microsoft.com/office/drawing/2014/main" id="{12B93C8E-C00E-4002-A3D5-FA0294CD6D7C}"/>
+              </a:ext>
+            </a:extLst>
+          </p:cNvPr>
+          <p:cNvCxnSpPr>
+            <a:cxnSpLocks/>
+          </p:cNvCxnSpPr>
+          <p:nvPr/>
+        </p:nvCxnSpPr>
+        <p:spPr>
+          <a:xfrm flipV="1">
+            <a:off x="3203848" y="970839"/>
+            <a:ext cx="946849" cy="4859316"/>
+          </a:xfrm>
+          <a:prstGeom prst="straightConnector1">
+            <a:avLst/>
+          </a:prstGeom>
+          <a:ln w="57150">
+            <a:solidFill>
+              <a:schemeClr val="tx1"/>
+            </a:solidFill>
+            <a:tailEnd type="triangle"/>
+          </a:ln>
+        </p:spPr>
+        <p:style>
+          <a:lnRef idx="1">
+            <a:schemeClr val="accent1"/>
+          </a:lnRef>
+          <a:fillRef idx="0">
+            <a:schemeClr val="accent1"/>
+          </a:fillRef>
+          <a:effectRef idx="0">
+            <a:schemeClr val="accent1"/>
+          </a:effectRef>
+          <a:fontRef idx="minor">
+            <a:schemeClr val="tx1"/>
+          </a:fontRef>
+        </p:style>
+      </p:cxnSp>
+      <mc:AlternateContent xmlns:mc="http://schemas.openxmlformats.org/markup-compatibility/2006">
+        <mc:Choice xmlns:a14="http://schemas.microsoft.com/office/drawing/2010/main" Requires="a14">
+          <p:sp>
+            <p:nvSpPr>
+              <p:cNvPr id="27" name="TextBox 26">
+                <a:extLst>
+                  <a:ext uri="{FF2B5EF4-FFF2-40B4-BE49-F238E27FC236}">
+                    <a16:creationId xmlns:a16="http://schemas.microsoft.com/office/drawing/2014/main" id="{6613D9F3-7A14-4F77-BF01-40CA03E133F4}"/>
+                  </a:ext>
+                </a:extLst>
+              </p:cNvPr>
+              <p:cNvSpPr txBox="1"/>
+              <p:nvPr/>
+            </p:nvSpPr>
+            <p:spPr>
+              <a:xfrm>
+                <a:off x="4769527" y="4133989"/>
+                <a:ext cx="3173881" cy="621452"/>
+              </a:xfrm>
+              <a:prstGeom prst="rect">
+                <a:avLst/>
+              </a:prstGeom>
+              <a:noFill/>
+            </p:spPr>
+            <p:txBody>
+              <a:bodyPr wrap="none" rtlCol="0">
+                <a:spAutoFit/>
+              </a:bodyPr>
+              <a:lstStyle/>
+              <a:p>
+                <a14:m>
+                  <m:oMathPara xmlns:m="http://schemas.openxmlformats.org/officeDocument/2006/math">
+                    <m:oMathParaPr>
+                      <m:jc m:val="centerGroup"/>
+                    </m:oMathParaPr>
+                    <m:oMath xmlns:m="http://schemas.openxmlformats.org/officeDocument/2006/math">
+                      <m:d>
+                        <m:dPr>
+                          <m:begChr m:val="|"/>
+                          <m:endChr m:val="|"/>
+                          <m:ctrlPr>
+                            <a:rPr lang="en-US" altLang="ko-KR" sz="2800" b="0" i="0" dirty="0" smtClean="0">
+                              <a:solidFill>
+                                <a:srgbClr val="FF0000"/>
+                              </a:solidFill>
+                              <a:latin typeface="Cambria Math" panose="02040503050406030204" pitchFamily="18" charset="0"/>
+                            </a:rPr>
+                          </m:ctrlPr>
+                        </m:dPr>
+                        <m:e>
+                          <m:acc>
+                            <m:accPr>
+                              <m:chr m:val="⃗"/>
+                              <m:ctrlPr>
+                                <a:rPr lang="en-US" altLang="ko-KR" sz="2800" b="0" i="1" dirty="0" smtClean="0">
+                                  <a:solidFill>
+                                    <a:srgbClr val="FF0000"/>
+                                  </a:solidFill>
+                                  <a:latin typeface="Cambria Math" panose="02040503050406030204" pitchFamily="18" charset="0"/>
+                                </a:rPr>
+                              </m:ctrlPr>
+                            </m:accPr>
+                            <m:e>
+                              <m:r>
+                                <a:rPr lang="en-US" altLang="ko-KR" sz="2800" b="0" i="1" dirty="0" smtClean="0">
+                                  <a:solidFill>
+                                    <a:srgbClr val="FF0000"/>
+                                  </a:solidFill>
+                                  <a:latin typeface="Cambria Math" panose="02040503050406030204" pitchFamily="18" charset="0"/>
+                                </a:rPr>
+                                <m:t>𝑏</m:t>
+                              </m:r>
+                            </m:e>
+                          </m:acc>
+                        </m:e>
+                      </m:d>
+                      <m:r>
+                        <m:rPr>
+                          <m:sty m:val="p"/>
+                        </m:rPr>
+                        <a:rPr lang="en-US" altLang="ko-KR" sz="2800" b="0" i="0" dirty="0" smtClean="0">
+                          <a:solidFill>
+                            <a:srgbClr val="FF0000"/>
+                          </a:solidFill>
+                          <a:latin typeface="Cambria Math" panose="02040503050406030204" pitchFamily="18" charset="0"/>
+                        </a:rPr>
+                        <m:t>cos</m:t>
+                      </m:r>
+                      <m:r>
+                        <a:rPr lang="en-US" altLang="ko-KR" sz="2800" b="0" i="1" dirty="0" smtClean="0">
+                          <a:solidFill>
+                            <a:srgbClr val="FF0000"/>
+                          </a:solidFill>
+                          <a:latin typeface="Cambria Math" panose="02040503050406030204" pitchFamily="18" charset="0"/>
+                        </a:rPr>
+                        <m:t>𝜃</m:t>
+                      </m:r>
+                      <m:r>
+                        <a:rPr lang="en-US" altLang="ko-KR" sz="2800" b="0" i="1" dirty="0" smtClean="0">
+                          <a:solidFill>
+                            <a:srgbClr val="FF0000"/>
+                          </a:solidFill>
+                          <a:latin typeface="Cambria Math" panose="02040503050406030204" pitchFamily="18" charset="0"/>
+                        </a:rPr>
+                        <m:t>=</m:t>
+                      </m:r>
+                      <m:r>
+                        <a:rPr lang="en-US" altLang="ko-KR" sz="2800" i="1">
+                          <a:solidFill>
+                            <a:srgbClr val="FF0000"/>
+                          </a:solidFill>
+                          <a:latin typeface="Cambria Math" panose="02040503050406030204" pitchFamily="18" charset="0"/>
+                        </a:rPr>
+                        <m:t>𝑐𝑜𝑚</m:t>
+                      </m:r>
+                      <m:sSub>
+                        <m:sSubPr>
+                          <m:ctrlPr>
+                            <a:rPr lang="en-US" altLang="ko-KR" sz="2800" i="1">
+                              <a:solidFill>
+                                <a:srgbClr val="FF0000"/>
+                              </a:solidFill>
+                              <a:latin typeface="Cambria Math" panose="02040503050406030204" pitchFamily="18" charset="0"/>
+                            </a:rPr>
+                          </m:ctrlPr>
+                        </m:sSubPr>
+                        <m:e>
+                          <m:r>
+                            <a:rPr lang="en-US" altLang="ko-KR" sz="2800" i="1">
+                              <a:solidFill>
+                                <a:srgbClr val="FF0000"/>
+                              </a:solidFill>
+                              <a:latin typeface="Cambria Math" panose="02040503050406030204" pitchFamily="18" charset="0"/>
+                            </a:rPr>
+                            <m:t>𝑝</m:t>
+                          </m:r>
+                        </m:e>
+                        <m:sub>
+                          <m:acc>
+                            <m:accPr>
+                              <m:chr m:val="⃗"/>
+                              <m:ctrlPr>
+                                <a:rPr lang="en-US" altLang="ko-KR" sz="2800" i="1">
+                                  <a:solidFill>
+                                    <a:srgbClr val="FF0000"/>
+                                  </a:solidFill>
+                                  <a:latin typeface="Cambria Math" panose="02040503050406030204" pitchFamily="18" charset="0"/>
+                                </a:rPr>
+                              </m:ctrlPr>
+                            </m:accPr>
+                            <m:e>
+                              <m:r>
+                                <a:rPr lang="en-US" altLang="ko-KR" sz="2800" i="1">
+                                  <a:solidFill>
+                                    <a:srgbClr val="FF0000"/>
+                                  </a:solidFill>
+                                  <a:latin typeface="Cambria Math" panose="02040503050406030204" pitchFamily="18" charset="0"/>
+                                </a:rPr>
+                                <m:t>𝑎</m:t>
+                              </m:r>
+                            </m:e>
+                          </m:acc>
+                        </m:sub>
+                      </m:sSub>
+                      <m:acc>
+                        <m:accPr>
+                          <m:chr m:val="⃗"/>
+                          <m:ctrlPr>
+                            <a:rPr lang="en-US" altLang="ko-KR" sz="2800" i="1">
+                              <a:solidFill>
+                                <a:srgbClr val="FF0000"/>
+                              </a:solidFill>
+                              <a:latin typeface="Cambria Math" panose="02040503050406030204" pitchFamily="18" charset="0"/>
+                            </a:rPr>
+                          </m:ctrlPr>
+                        </m:accPr>
+                        <m:e>
+                          <m:r>
+                            <a:rPr lang="en-US" altLang="ko-KR" sz="2800" i="1">
+                              <a:solidFill>
+                                <a:srgbClr val="FF0000"/>
+                              </a:solidFill>
+                              <a:latin typeface="Cambria Math" panose="02040503050406030204" pitchFamily="18" charset="0"/>
+                            </a:rPr>
+                            <m:t>𝑏</m:t>
+                          </m:r>
+                        </m:e>
+                      </m:acc>
+                    </m:oMath>
+                  </m:oMathPara>
+                </a14:m>
+                <a:endParaRPr lang="en-US" altLang="ko-KR" sz="2800" dirty="0">
+                  <a:solidFill>
+                    <a:srgbClr val="FF0000"/>
+                  </a:solidFill>
+                </a:endParaRPr>
+              </a:p>
+            </p:txBody>
+          </p:sp>
+        </mc:Choice>
+        <mc:Fallback>
+          <p:sp>
+            <p:nvSpPr>
+              <p:cNvPr id="27" name="TextBox 26">
+                <a:extLst>
+                  <a:ext uri="{FF2B5EF4-FFF2-40B4-BE49-F238E27FC236}">
+                    <a16:creationId xmlns:a16="http://schemas.microsoft.com/office/drawing/2014/main" id="{6613D9F3-7A14-4F77-BF01-40CA03E133F4}"/>
+                  </a:ext>
+                </a:extLst>
+              </p:cNvPr>
+              <p:cNvSpPr txBox="1">
+                <a:spLocks noRot="1" noChangeAspect="1" noMove="1" noResize="1" noEditPoints="1" noAdjustHandles="1" noChangeArrowheads="1" noChangeShapeType="1" noTextEdit="1"/>
+              </p:cNvSpPr>
+              <p:nvPr/>
+            </p:nvSpPr>
+            <p:spPr>
+              <a:xfrm>
+                <a:off x="4769527" y="4133989"/>
+                <a:ext cx="3173881" cy="621452"/>
+              </a:xfrm>
+              <a:prstGeom prst="rect">
+                <a:avLst/>
+              </a:prstGeom>
+              <a:blipFill>
+                <a:blip r:embed="rId5"/>
+                <a:stretch>
+                  <a:fillRect/>
+                </a:stretch>
+              </a:blipFill>
+            </p:spPr>
+            <p:txBody>
+              <a:bodyPr/>
+              <a:lstStyle/>
+              <a:p>
+                <a:r>
+                  <a:rPr lang="ko-KR" altLang="en-US">
+                    <a:noFill/>
+                  </a:rPr>
+                  <a:t> </a:t>
+                </a:r>
+              </a:p>
+            </p:txBody>
+          </p:sp>
+        </mc:Fallback>
+      </mc:AlternateContent>
+      <mc:AlternateContent xmlns:mc="http://schemas.openxmlformats.org/markup-compatibility/2006">
+        <mc:Choice xmlns:a14="http://schemas.microsoft.com/office/drawing/2010/main" Requires="a14">
+          <p:sp>
+            <p:nvSpPr>
+              <p:cNvPr id="29" name="TextBox 28">
+                <a:extLst>
+                  <a:ext uri="{FF2B5EF4-FFF2-40B4-BE49-F238E27FC236}">
+                    <a16:creationId xmlns:a16="http://schemas.microsoft.com/office/drawing/2014/main" id="{134DC0A7-85D5-4797-98AD-E086BC3532A9}"/>
+                  </a:ext>
+                </a:extLst>
+              </p:cNvPr>
+              <p:cNvSpPr txBox="1"/>
+              <p:nvPr/>
+            </p:nvSpPr>
+            <p:spPr>
+              <a:xfrm>
+                <a:off x="4283968" y="4701668"/>
+                <a:ext cx="4114720" cy="445635"/>
+              </a:xfrm>
+              <a:prstGeom prst="rect">
+                <a:avLst/>
+              </a:prstGeom>
+              <a:noFill/>
+            </p:spPr>
+            <p:txBody>
+              <a:bodyPr wrap="square">
+                <a:spAutoFit/>
+              </a:bodyPr>
+              <a:lstStyle/>
+              <a:p>
+                <a:pPr algn="ctr"/>
+                <a:r>
+                  <a:rPr lang="ko-KR" altLang="en-US" sz="2000" dirty="0">
+                    <a:latin typeface="배달의민족 주아" panose="02020603020101020101" pitchFamily="18" charset="-127"/>
+                    <a:ea typeface="배달의민족 주아" panose="02020603020101020101" pitchFamily="18" charset="-127"/>
+                  </a:rPr>
+                  <a:t>벡터 </a:t>
+                </a:r>
+                <a14:m>
+                  <m:oMath xmlns:m="http://schemas.openxmlformats.org/officeDocument/2006/math">
+                    <m:acc>
+                      <m:accPr>
+                        <m:chr m:val="⃗"/>
+                        <m:ctrlPr>
+                          <a:rPr lang="en-US" altLang="ko-KR" sz="2000" b="0" i="1" smtClean="0">
+                            <a:latin typeface="Cambria Math" panose="02040503050406030204" pitchFamily="18" charset="0"/>
+                          </a:rPr>
+                        </m:ctrlPr>
+                      </m:accPr>
+                      <m:e>
+                        <m:r>
+                          <a:rPr lang="en-US" altLang="ko-KR" sz="2000" b="0" i="1" smtClean="0">
+                            <a:latin typeface="Cambria Math" panose="02040503050406030204" pitchFamily="18" charset="0"/>
+                          </a:rPr>
+                          <m:t>𝑏</m:t>
+                        </m:r>
+                      </m:e>
+                    </m:acc>
+                    <m:r>
+                      <a:rPr lang="ko-KR" altLang="en-US" sz="2000" i="1" dirty="0">
+                        <a:latin typeface="Cambria Math" panose="02040503050406030204" pitchFamily="18" charset="0"/>
+                      </a:rPr>
+                      <m:t>의</m:t>
+                    </m:r>
+                  </m:oMath>
+                </a14:m>
+                <a:r>
+                  <a:rPr lang="ko-KR" altLang="en-US" sz="2000" dirty="0">
+                    <a:latin typeface="배달의민족 주아" panose="02020603020101020101" pitchFamily="18" charset="-127"/>
+                    <a:ea typeface="배달의민족 주아" panose="02020603020101020101" pitchFamily="18" charset="-127"/>
+                  </a:rPr>
+                  <a:t> </a:t>
+                </a:r>
+                <a14:m>
+                  <m:oMath xmlns:m="http://schemas.openxmlformats.org/officeDocument/2006/math">
+                    <m:acc>
+                      <m:accPr>
+                        <m:chr m:val="⃗"/>
+                        <m:ctrlPr>
+                          <a:rPr lang="en-US" altLang="ko-KR" sz="2000" b="0" i="1" dirty="0" smtClean="0">
+                            <a:latin typeface="Cambria Math" panose="02040503050406030204" pitchFamily="18" charset="0"/>
+                          </a:rPr>
+                        </m:ctrlPr>
+                      </m:accPr>
+                      <m:e>
+                        <m:r>
+                          <a:rPr lang="en-US" altLang="ko-KR" sz="2000" b="0" i="1" dirty="0" smtClean="0">
+                            <a:latin typeface="Cambria Math" panose="02040503050406030204" pitchFamily="18" charset="0"/>
+                          </a:rPr>
+                          <m:t>𝑎</m:t>
+                        </m:r>
+                      </m:e>
+                    </m:acc>
+                    <m:r>
+                      <a:rPr lang="en-US" altLang="ko-KR" sz="2000" b="0" i="1" dirty="0" smtClean="0">
+                        <a:latin typeface="Cambria Math" panose="02040503050406030204" pitchFamily="18" charset="0"/>
+                      </a:rPr>
+                      <m:t> </m:t>
+                    </m:r>
+                  </m:oMath>
+                </a14:m>
+                <a:r>
+                  <a:rPr lang="ko-KR" altLang="en-US" sz="2000" dirty="0">
+                    <a:latin typeface="배달의민족 주아" panose="02020603020101020101" pitchFamily="18" charset="-127"/>
+                    <a:ea typeface="배달의민족 주아" panose="02020603020101020101" pitchFamily="18" charset="-127"/>
+                  </a:rPr>
+                  <a:t>방향 컴포넌트 </a:t>
+                </a:r>
+                <a:r>
+                  <a:rPr lang="en-US" altLang="ko-KR" sz="2000" dirty="0">
+                    <a:latin typeface="배달의민족 주아" panose="02020603020101020101" pitchFamily="18" charset="-127"/>
+                    <a:ea typeface="배달의민족 주아" panose="02020603020101020101" pitchFamily="18" charset="-127"/>
+                  </a:rPr>
+                  <a:t>(</a:t>
+                </a:r>
+                <a:r>
+                  <a:rPr lang="ko-KR" altLang="en-US" sz="2000" dirty="0">
+                    <a:latin typeface="배달의민족 주아" panose="02020603020101020101" pitchFamily="18" charset="-127"/>
+                    <a:ea typeface="배달의민족 주아" panose="02020603020101020101" pitchFamily="18" charset="-127"/>
+                  </a:rPr>
+                  <a:t>스칼라</a:t>
+                </a:r>
+                <a:r>
+                  <a:rPr lang="en-US" altLang="ko-KR" sz="2000" dirty="0">
+                    <a:latin typeface="배달의민족 주아" panose="02020603020101020101" pitchFamily="18" charset="-127"/>
+                    <a:ea typeface="배달의민족 주아" panose="02020603020101020101" pitchFamily="18" charset="-127"/>
+                  </a:rPr>
+                  <a:t>)</a:t>
+                </a:r>
+              </a:p>
+            </p:txBody>
+          </p:sp>
+        </mc:Choice>
+        <mc:Fallback>
+          <p:sp>
+            <p:nvSpPr>
+              <p:cNvPr id="29" name="TextBox 28">
+                <a:extLst>
+                  <a:ext uri="{FF2B5EF4-FFF2-40B4-BE49-F238E27FC236}">
+                    <a16:creationId xmlns:a16="http://schemas.microsoft.com/office/drawing/2014/main" id="{134DC0A7-85D5-4797-98AD-E086BC3532A9}"/>
+                  </a:ext>
+                </a:extLst>
+              </p:cNvPr>
+              <p:cNvSpPr txBox="1">
+                <a:spLocks noRot="1" noChangeAspect="1" noMove="1" noResize="1" noEditPoints="1" noAdjustHandles="1" noChangeArrowheads="1" noChangeShapeType="1" noTextEdit="1"/>
+              </p:cNvSpPr>
+              <p:nvPr/>
+            </p:nvSpPr>
+            <p:spPr>
+              <a:xfrm>
+                <a:off x="4283968" y="4701668"/>
+                <a:ext cx="4114720" cy="445635"/>
+              </a:xfrm>
+              <a:prstGeom prst="rect">
+                <a:avLst/>
+              </a:prstGeom>
+              <a:blipFill>
+                <a:blip r:embed="rId6"/>
+                <a:stretch>
+                  <a:fillRect t="-9589" b="-26027"/>
+                </a:stretch>
+              </a:blipFill>
+            </p:spPr>
+            <p:txBody>
+              <a:bodyPr/>
+              <a:lstStyle/>
+              <a:p>
+                <a:r>
+                  <a:rPr lang="ko-KR" altLang="en-US">
+                    <a:noFill/>
+                  </a:rPr>
+                  <a:t> </a:t>
+                </a:r>
+              </a:p>
+            </p:txBody>
+          </p:sp>
+        </mc:Fallback>
+      </mc:AlternateContent>
+    </p:spTree>
+    <p:extLst>
+      <p:ext uri="{BB962C8B-B14F-4D97-AF65-F5344CB8AC3E}">
+        <p14:creationId xmlns:p14="http://schemas.microsoft.com/office/powerpoint/2010/main" val="2203934715"/>
+      </p:ext>
+    </p:extLst>
+  </p:cSld>
+  <p:clrMapOvr>
+    <a:masterClrMapping/>
+  </p:clrMapOvr>
+</p:sld>
+</file>
+
+<file path=ppt/slides/slide2.xml><?xml version="1.0" encoding="utf-8"?>
+<p:sld xmlns:a="http://schemas.openxmlformats.org/drawingml/2006/main" xmlns:r="http://schemas.openxmlformats.org/officeDocument/2006/relationships" xmlns:p="http://schemas.openxmlformats.org/presentationml/2006/main">
+  <p:cSld>
+    <p:spTree>
+      <p:nvGrpSpPr>
+        <p:cNvPr id="1" name=""/>
+        <p:cNvGrpSpPr/>
+        <p:nvPr/>
+      </p:nvGrpSpPr>
+      <p:grpSpPr>
+        <a:xfrm>
+          <a:off x="0" y="0"/>
+          <a:ext cx="0" cy="0"/>
+          <a:chOff x="0" y="0"/>
+          <a:chExt cx="0" cy="0"/>
+        </a:xfrm>
+      </p:grpSpPr>
+      <p:sp>
+        <p:nvSpPr>
+          <p:cNvPr id="13" name="원호 12">
+            <a:extLst>
+              <a:ext uri="{FF2B5EF4-FFF2-40B4-BE49-F238E27FC236}">
+                <a16:creationId xmlns:a16="http://schemas.microsoft.com/office/drawing/2014/main" id="{888DF389-40DF-44D4-9804-A162E620F3E1}"/>
+              </a:ext>
+            </a:extLst>
+          </p:cNvPr>
+          <p:cNvSpPr/>
+          <p:nvPr/>
+        </p:nvSpPr>
+        <p:spPr>
+          <a:xfrm>
+            <a:off x="2071614" y="4803535"/>
+            <a:ext cx="1427989" cy="1427989"/>
+          </a:xfrm>
+          <a:prstGeom prst="arc">
+            <a:avLst>
+              <a:gd name="adj1" fmla="val 17125588"/>
+              <a:gd name="adj2" fmla="val 19622520"/>
+            </a:avLst>
+          </a:prstGeom>
+          <a:ln>
+            <a:solidFill>
+              <a:schemeClr val="tx1"/>
+            </a:solidFill>
+            <a:prstDash val="dash"/>
+          </a:ln>
+        </p:spPr>
+        <p:style>
+          <a:lnRef idx="1">
+            <a:schemeClr val="accent1"/>
+          </a:lnRef>
+          <a:fillRef idx="0">
+            <a:schemeClr val="accent1"/>
+          </a:fillRef>
+          <a:effectRef idx="0">
+            <a:schemeClr val="accent1"/>
+          </a:effectRef>
+          <a:fontRef idx="minor">
+            <a:schemeClr val="tx1"/>
+          </a:fontRef>
+        </p:style>
+        <p:txBody>
+          <a:bodyPr rtlCol="0" anchor="ctr"/>
+          <a:lstStyle/>
+          <a:p>
+            <a:pPr algn="ctr"/>
+            <a:endParaRPr lang="ko-KR" altLang="en-US"/>
+          </a:p>
+        </p:txBody>
+      </p:sp>
+      <p:cxnSp>
+        <p:nvCxnSpPr>
+          <p:cNvPr id="6" name="직선 화살표 연결선 5">
+            <a:extLst>
+              <a:ext uri="{FF2B5EF4-FFF2-40B4-BE49-F238E27FC236}">
+                <a16:creationId xmlns:a16="http://schemas.microsoft.com/office/drawing/2014/main" id="{41871895-115B-4C2D-8AA2-35A27E339D32}"/>
+              </a:ext>
+            </a:extLst>
+          </p:cNvPr>
+          <p:cNvCxnSpPr>
+            <a:cxnSpLocks/>
+          </p:cNvCxnSpPr>
+          <p:nvPr/>
+        </p:nvCxnSpPr>
+        <p:spPr>
+          <a:xfrm flipV="1">
+            <a:off x="2785609" y="1161971"/>
+            <a:ext cx="4607188" cy="4534057"/>
+          </a:xfrm>
+          <a:prstGeom prst="straightConnector1">
+            <a:avLst/>
+          </a:prstGeom>
+          <a:ln w="57150">
+            <a:solidFill>
+              <a:schemeClr val="tx1"/>
+            </a:solidFill>
+            <a:tailEnd type="triangle"/>
+          </a:ln>
+        </p:spPr>
+        <p:style>
+          <a:lnRef idx="1">
+            <a:schemeClr val="accent1"/>
+          </a:lnRef>
+          <a:fillRef idx="0">
+            <a:schemeClr val="accent1"/>
+          </a:fillRef>
+          <a:effectRef idx="0">
+            <a:schemeClr val="accent1"/>
+          </a:effectRef>
+          <a:fontRef idx="minor">
+            <a:schemeClr val="tx1"/>
+          </a:fontRef>
+        </p:style>
+      </p:cxnSp>
+      <p:cxnSp>
+        <p:nvCxnSpPr>
+          <p:cNvPr id="10" name="직선 연결선 9">
+            <a:extLst>
+              <a:ext uri="{FF2B5EF4-FFF2-40B4-BE49-F238E27FC236}">
+                <a16:creationId xmlns:a16="http://schemas.microsoft.com/office/drawing/2014/main" id="{A9909453-2E4A-47E9-BF6C-31F5730E0AA2}"/>
+              </a:ext>
+            </a:extLst>
+          </p:cNvPr>
+          <p:cNvCxnSpPr>
+            <a:cxnSpLocks/>
+          </p:cNvCxnSpPr>
+          <p:nvPr/>
+        </p:nvCxnSpPr>
+        <p:spPr>
+          <a:xfrm>
+            <a:off x="3736528" y="846601"/>
+            <a:ext cx="1947603" cy="1947603"/>
+          </a:xfrm>
+          <a:prstGeom prst="line">
+            <a:avLst/>
+          </a:prstGeom>
+          <a:ln>
+            <a:solidFill>
+              <a:schemeClr val="tx1"/>
+            </a:solidFill>
+            <a:prstDash val="dash"/>
+          </a:ln>
+        </p:spPr>
+        <p:style>
+          <a:lnRef idx="1">
+            <a:schemeClr val="accent1"/>
+          </a:lnRef>
+          <a:fillRef idx="0">
+            <a:schemeClr val="accent1"/>
+          </a:fillRef>
+          <a:effectRef idx="0">
+            <a:schemeClr val="accent1"/>
+          </a:effectRef>
+          <a:fontRef idx="minor">
+            <a:schemeClr val="tx1"/>
+          </a:fontRef>
+        </p:style>
+      </p:cxnSp>
+      <p:cxnSp>
+        <p:nvCxnSpPr>
+          <p:cNvPr id="11" name="직선 화살표 연결선 10">
+            <a:extLst>
+              <a:ext uri="{FF2B5EF4-FFF2-40B4-BE49-F238E27FC236}">
+                <a16:creationId xmlns:a16="http://schemas.microsoft.com/office/drawing/2014/main" id="{E11BA27E-F99C-44A9-8E1C-71DC2258D47E}"/>
+              </a:ext>
+            </a:extLst>
+          </p:cNvPr>
+          <p:cNvCxnSpPr>
+            <a:cxnSpLocks/>
+          </p:cNvCxnSpPr>
+          <p:nvPr/>
+        </p:nvCxnSpPr>
+        <p:spPr>
+          <a:xfrm flipV="1">
+            <a:off x="2798309" y="2834140"/>
+            <a:ext cx="2908048" cy="2861889"/>
+          </a:xfrm>
+          <a:prstGeom prst="straightConnector1">
+            <a:avLst/>
+          </a:prstGeom>
+          <a:ln w="76200">
+            <a:solidFill>
+              <a:srgbClr val="FF0000"/>
+            </a:solidFill>
+            <a:headEnd type="none" w="med" len="med"/>
+            <a:tailEnd type="arrow" w="med" len="med"/>
+          </a:ln>
+        </p:spPr>
+        <p:style>
+          <a:lnRef idx="1">
+            <a:schemeClr val="accent1"/>
+          </a:lnRef>
+          <a:fillRef idx="0">
+            <a:schemeClr val="accent1"/>
+          </a:fillRef>
+          <a:effectRef idx="0">
+            <a:schemeClr val="accent1"/>
+          </a:effectRef>
+          <a:fontRef idx="minor">
+            <a:schemeClr val="tx1"/>
+          </a:fontRef>
+        </p:style>
+      </p:cxnSp>
+      <mc:AlternateContent xmlns:mc="http://schemas.openxmlformats.org/markup-compatibility/2006">
+        <mc:Choice xmlns:a14="http://schemas.microsoft.com/office/drawing/2010/main" Requires="a14">
+          <p:sp>
+            <p:nvSpPr>
+              <p:cNvPr id="14" name="TextBox 13">
+                <a:extLst>
+                  <a:ext uri="{FF2B5EF4-FFF2-40B4-BE49-F238E27FC236}">
+                    <a16:creationId xmlns:a16="http://schemas.microsoft.com/office/drawing/2014/main" id="{F845D679-1B65-4B49-A4EA-166A9898B0D1}"/>
+                  </a:ext>
+                </a:extLst>
+              </p:cNvPr>
+              <p:cNvSpPr txBox="1"/>
+              <p:nvPr/>
+            </p:nvSpPr>
+            <p:spPr>
+              <a:xfrm>
+                <a:off x="3028967" y="4387452"/>
+                <a:ext cx="571823" cy="584775"/>
+              </a:xfrm>
+              <a:prstGeom prst="rect">
+                <a:avLst/>
+              </a:prstGeom>
+              <a:noFill/>
+            </p:spPr>
+            <p:txBody>
+              <a:bodyPr wrap="none" rtlCol="0">
+                <a:spAutoFit/>
+              </a:bodyPr>
+              <a:lstStyle/>
+              <a:p>
+                <a14:m>
+                  <m:oMathPara xmlns:m="http://schemas.openxmlformats.org/officeDocument/2006/math">
+                    <m:oMathParaPr>
+                      <m:jc m:val="centerGroup"/>
+                    </m:oMathParaPr>
+                    <m:oMath xmlns:m="http://schemas.openxmlformats.org/officeDocument/2006/math">
+                      <m:r>
+                        <a:rPr lang="en-US" altLang="ko-KR" sz="3200" b="0" i="1" smtClean="0">
+                          <a:latin typeface="Cambria Math" panose="02040503050406030204" pitchFamily="18" charset="0"/>
+                        </a:rPr>
+                        <m:t>𝜃</m:t>
+                      </m:r>
+                    </m:oMath>
+                  </m:oMathPara>
+                </a14:m>
+                <a:endParaRPr lang="ko-KR" altLang="en-US" sz="3200" dirty="0"/>
+              </a:p>
+            </p:txBody>
+          </p:sp>
+        </mc:Choice>
+        <mc:Fallback>
+          <p:sp>
+            <p:nvSpPr>
+              <p:cNvPr id="14" name="TextBox 13">
+                <a:extLst>
+                  <a:ext uri="{FF2B5EF4-FFF2-40B4-BE49-F238E27FC236}">
+                    <a16:creationId xmlns:a16="http://schemas.microsoft.com/office/drawing/2014/main" id="{F845D679-1B65-4B49-A4EA-166A9898B0D1}"/>
+                  </a:ext>
+                </a:extLst>
+              </p:cNvPr>
+              <p:cNvSpPr txBox="1">
+                <a:spLocks noRot="1" noChangeAspect="1" noMove="1" noResize="1" noEditPoints="1" noAdjustHandles="1" noChangeArrowheads="1" noChangeShapeType="1" noTextEdit="1"/>
+              </p:cNvSpPr>
+              <p:nvPr/>
+            </p:nvSpPr>
+            <p:spPr>
+              <a:xfrm>
+                <a:off x="3028967" y="4387452"/>
+                <a:ext cx="571823" cy="584775"/>
+              </a:xfrm>
+              <a:prstGeom prst="rect">
+                <a:avLst/>
+              </a:prstGeom>
+              <a:blipFill>
+                <a:blip r:embed="rId2"/>
+                <a:stretch>
+                  <a:fillRect/>
+                </a:stretch>
+              </a:blipFill>
+            </p:spPr>
+            <p:txBody>
+              <a:bodyPr/>
+              <a:lstStyle/>
+              <a:p>
+                <a:r>
+                  <a:rPr lang="ko-KR" altLang="en-US">
+                    <a:noFill/>
+                  </a:rPr>
+                  <a:t> </a:t>
+                </a:r>
+              </a:p>
+            </p:txBody>
+          </p:sp>
+        </mc:Fallback>
+      </mc:AlternateContent>
+      <mc:AlternateContent xmlns:mc="http://schemas.openxmlformats.org/markup-compatibility/2006">
+        <mc:Choice xmlns:a14="http://schemas.microsoft.com/office/drawing/2010/main" Requires="a14">
+          <p:sp>
+            <p:nvSpPr>
+              <p:cNvPr id="16" name="TextBox 15">
+                <a:extLst>
+                  <a:ext uri="{FF2B5EF4-FFF2-40B4-BE49-F238E27FC236}">
+                    <a16:creationId xmlns:a16="http://schemas.microsoft.com/office/drawing/2014/main" id="{DC8C783C-A7A5-40AB-958D-D307F63BE019}"/>
+                  </a:ext>
+                </a:extLst>
+              </p:cNvPr>
+              <p:cNvSpPr txBox="1"/>
+              <p:nvPr/>
+            </p:nvSpPr>
+            <p:spPr>
+              <a:xfrm>
+                <a:off x="3079726" y="642502"/>
+                <a:ext cx="559191" cy="657681"/>
+              </a:xfrm>
+              <a:prstGeom prst="rect">
+                <a:avLst/>
+              </a:prstGeom>
+              <a:noFill/>
+            </p:spPr>
+            <p:txBody>
+              <a:bodyPr wrap="none" rtlCol="0">
+                <a:spAutoFit/>
+              </a:bodyPr>
+              <a:lstStyle/>
+              <a:p>
+                <a14:m>
+                  <m:oMathPara xmlns:m="http://schemas.openxmlformats.org/officeDocument/2006/math">
+                    <m:oMathParaPr>
+                      <m:jc m:val="centerGroup"/>
+                    </m:oMathParaPr>
+                    <m:oMath xmlns:m="http://schemas.openxmlformats.org/officeDocument/2006/math">
+                      <m:acc>
+                        <m:accPr>
+                          <m:chr m:val="⃗"/>
+                          <m:ctrlPr>
+                            <a:rPr lang="en-US" altLang="ko-KR" sz="3200" b="0" i="1" smtClean="0">
+                              <a:latin typeface="Cambria Math" panose="02040503050406030204" pitchFamily="18" charset="0"/>
+                            </a:rPr>
+                          </m:ctrlPr>
+                        </m:accPr>
+                        <m:e>
+                          <m:r>
+                            <a:rPr lang="en-US" altLang="ko-KR" sz="3200" b="0" i="1" smtClean="0">
+                              <a:latin typeface="Cambria Math" panose="02040503050406030204" pitchFamily="18" charset="0"/>
+                            </a:rPr>
+                            <m:t>𝑏</m:t>
+                          </m:r>
+                        </m:e>
+                      </m:acc>
+                    </m:oMath>
+                  </m:oMathPara>
+                </a14:m>
+                <a:endParaRPr lang="ko-KR" altLang="en-US" sz="3200" dirty="0"/>
+              </a:p>
+            </p:txBody>
+          </p:sp>
+        </mc:Choice>
+        <mc:Fallback>
+          <p:sp>
+            <p:nvSpPr>
+              <p:cNvPr id="16" name="TextBox 15">
+                <a:extLst>
+                  <a:ext uri="{FF2B5EF4-FFF2-40B4-BE49-F238E27FC236}">
+                    <a16:creationId xmlns:a16="http://schemas.microsoft.com/office/drawing/2014/main" id="{DC8C783C-A7A5-40AB-958D-D307F63BE019}"/>
+                  </a:ext>
+                </a:extLst>
+              </p:cNvPr>
+              <p:cNvSpPr txBox="1">
+                <a:spLocks noRot="1" noChangeAspect="1" noMove="1" noResize="1" noEditPoints="1" noAdjustHandles="1" noChangeArrowheads="1" noChangeShapeType="1" noTextEdit="1"/>
+              </p:cNvSpPr>
+              <p:nvPr/>
+            </p:nvSpPr>
+            <p:spPr>
+              <a:xfrm>
+                <a:off x="3079726" y="642502"/>
+                <a:ext cx="559191" cy="657681"/>
+              </a:xfrm>
+              <a:prstGeom prst="rect">
+                <a:avLst/>
+              </a:prstGeom>
+              <a:blipFill>
+                <a:blip r:embed="rId3"/>
+                <a:stretch>
+                  <a:fillRect/>
+                </a:stretch>
+              </a:blipFill>
+            </p:spPr>
+            <p:txBody>
+              <a:bodyPr/>
+              <a:lstStyle/>
+              <a:p>
+                <a:r>
+                  <a:rPr lang="ko-KR" altLang="en-US">
+                    <a:noFill/>
+                  </a:rPr>
+                  <a:t> </a:t>
+                </a:r>
+              </a:p>
+            </p:txBody>
+          </p:sp>
+        </mc:Fallback>
+      </mc:AlternateContent>
+      <mc:AlternateContent xmlns:mc="http://schemas.openxmlformats.org/markup-compatibility/2006">
+        <mc:Choice xmlns:a14="http://schemas.microsoft.com/office/drawing/2010/main" Requires="a14">
+          <p:sp>
+            <p:nvSpPr>
+              <p:cNvPr id="17" name="TextBox 16">
+                <a:extLst>
+                  <a:ext uri="{FF2B5EF4-FFF2-40B4-BE49-F238E27FC236}">
+                    <a16:creationId xmlns:a16="http://schemas.microsoft.com/office/drawing/2014/main" id="{AC074638-91A2-427E-82A2-58A17708AF61}"/>
+                  </a:ext>
+                </a:extLst>
+              </p:cNvPr>
+              <p:cNvSpPr txBox="1"/>
+              <p:nvPr/>
+            </p:nvSpPr>
+            <p:spPr>
+              <a:xfrm>
+                <a:off x="7410352" y="965814"/>
+                <a:ext cx="568169" cy="584775"/>
+              </a:xfrm>
+              <a:prstGeom prst="rect">
+                <a:avLst/>
+              </a:prstGeom>
+              <a:noFill/>
+            </p:spPr>
+            <p:txBody>
+              <a:bodyPr wrap="none" rtlCol="0">
+                <a:spAutoFit/>
+              </a:bodyPr>
+              <a:lstStyle/>
+              <a:p>
+                <a14:m>
+                  <m:oMathPara xmlns:m="http://schemas.openxmlformats.org/officeDocument/2006/math">
+                    <m:oMathParaPr>
+                      <m:jc m:val="centerGroup"/>
+                    </m:oMathParaPr>
+                    <m:oMath xmlns:m="http://schemas.openxmlformats.org/officeDocument/2006/math">
+                      <m:acc>
+                        <m:accPr>
+                          <m:chr m:val="⃗"/>
+                          <m:ctrlPr>
+                            <a:rPr lang="en-US" altLang="ko-KR" sz="3200" b="0" i="1" smtClean="0">
+                              <a:latin typeface="Cambria Math" panose="02040503050406030204" pitchFamily="18" charset="0"/>
+                            </a:rPr>
+                          </m:ctrlPr>
+                        </m:accPr>
+                        <m:e>
+                          <m:r>
+                            <a:rPr lang="en-US" altLang="ko-KR" sz="3200" b="0" i="1" smtClean="0">
+                              <a:latin typeface="Cambria Math" panose="02040503050406030204" pitchFamily="18" charset="0"/>
+                            </a:rPr>
+                            <m:t>𝑎</m:t>
+                          </m:r>
+                        </m:e>
+                      </m:acc>
+                    </m:oMath>
+                  </m:oMathPara>
+                </a14:m>
+                <a:endParaRPr lang="ko-KR" altLang="en-US" sz="3200" dirty="0"/>
+              </a:p>
+            </p:txBody>
+          </p:sp>
+        </mc:Choice>
+        <mc:Fallback>
+          <p:sp>
+            <p:nvSpPr>
+              <p:cNvPr id="17" name="TextBox 16">
+                <a:extLst>
+                  <a:ext uri="{FF2B5EF4-FFF2-40B4-BE49-F238E27FC236}">
+                    <a16:creationId xmlns:a16="http://schemas.microsoft.com/office/drawing/2014/main" id="{AC074638-91A2-427E-82A2-58A17708AF61}"/>
+                  </a:ext>
+                </a:extLst>
+              </p:cNvPr>
+              <p:cNvSpPr txBox="1">
+                <a:spLocks noRot="1" noChangeAspect="1" noMove="1" noResize="1" noEditPoints="1" noAdjustHandles="1" noChangeArrowheads="1" noChangeShapeType="1" noTextEdit="1"/>
+              </p:cNvSpPr>
+              <p:nvPr/>
+            </p:nvSpPr>
+            <p:spPr>
+              <a:xfrm>
+                <a:off x="7410352" y="965814"/>
+                <a:ext cx="568169" cy="584775"/>
+              </a:xfrm>
+              <a:prstGeom prst="rect">
+                <a:avLst/>
+              </a:prstGeom>
+              <a:blipFill>
+                <a:blip r:embed="rId4"/>
+                <a:stretch>
+                  <a:fillRect/>
+                </a:stretch>
+              </a:blipFill>
+            </p:spPr>
+            <p:txBody>
+              <a:bodyPr/>
+              <a:lstStyle/>
+              <a:p>
+                <a:r>
+                  <a:rPr lang="ko-KR" altLang="en-US">
+                    <a:noFill/>
+                  </a:rPr>
+                  <a:t> </a:t>
+                </a:r>
+              </a:p>
+            </p:txBody>
+          </p:sp>
+        </mc:Fallback>
+      </mc:AlternateContent>
+      <p:cxnSp>
+        <p:nvCxnSpPr>
+          <p:cNvPr id="24" name="직선 연결선 23">
+            <a:extLst>
+              <a:ext uri="{FF2B5EF4-FFF2-40B4-BE49-F238E27FC236}">
+                <a16:creationId xmlns:a16="http://schemas.microsoft.com/office/drawing/2014/main" id="{22BDED62-7F2B-4B1A-90BE-2E4369F8A961}"/>
+              </a:ext>
+            </a:extLst>
+          </p:cNvPr>
+          <p:cNvCxnSpPr>
+            <a:cxnSpLocks/>
+          </p:cNvCxnSpPr>
+          <p:nvPr/>
+        </p:nvCxnSpPr>
+        <p:spPr>
+          <a:xfrm>
+            <a:off x="828469" y="3699698"/>
+            <a:ext cx="1996330" cy="1996330"/>
+          </a:xfrm>
+          <a:prstGeom prst="line">
+            <a:avLst/>
+          </a:prstGeom>
+          <a:ln>
+            <a:solidFill>
+              <a:schemeClr val="tx1"/>
+            </a:solidFill>
+            <a:prstDash val="dash"/>
+          </a:ln>
+        </p:spPr>
+        <p:style>
+          <a:lnRef idx="1">
+            <a:schemeClr val="accent1"/>
+          </a:lnRef>
+          <a:fillRef idx="0">
+            <a:schemeClr val="accent1"/>
+          </a:fillRef>
+          <a:effectRef idx="0">
+            <a:schemeClr val="accent1"/>
+          </a:effectRef>
+          <a:fontRef idx="minor">
+            <a:schemeClr val="tx1"/>
+          </a:fontRef>
+        </p:style>
+      </p:cxnSp>
+      <p:cxnSp>
+        <p:nvCxnSpPr>
+          <p:cNvPr id="25" name="직선 화살표 연결선 24">
+            <a:extLst>
+              <a:ext uri="{FF2B5EF4-FFF2-40B4-BE49-F238E27FC236}">
+                <a16:creationId xmlns:a16="http://schemas.microsoft.com/office/drawing/2014/main" id="{DEC2B096-5976-46F7-AE8F-EFB24C3C3A4D}"/>
+              </a:ext>
+            </a:extLst>
+          </p:cNvPr>
+          <p:cNvCxnSpPr>
+            <a:cxnSpLocks/>
+          </p:cNvCxnSpPr>
+          <p:nvPr/>
+        </p:nvCxnSpPr>
+        <p:spPr>
+          <a:xfrm flipV="1">
+            <a:off x="823718" y="837809"/>
+            <a:ext cx="2908048" cy="2861889"/>
+          </a:xfrm>
+          <a:prstGeom prst="straightConnector1">
+            <a:avLst/>
+          </a:prstGeom>
+          <a:ln w="9525">
+            <a:solidFill>
+              <a:schemeClr val="tx1"/>
+            </a:solidFill>
+            <a:prstDash val="sysDash"/>
+            <a:headEnd type="none" w="med" len="med"/>
+            <a:tailEnd type="none" w="med" len="med"/>
+          </a:ln>
+        </p:spPr>
+        <p:style>
+          <a:lnRef idx="1">
+            <a:schemeClr val="accent1"/>
+          </a:lnRef>
+          <a:fillRef idx="0">
+            <a:schemeClr val="accent1"/>
+          </a:fillRef>
+          <a:effectRef idx="0">
+            <a:schemeClr val="accent1"/>
+          </a:effectRef>
+          <a:fontRef idx="minor">
+            <a:schemeClr val="tx1"/>
+          </a:fontRef>
+        </p:style>
+      </p:cxnSp>
+      <p:cxnSp>
+        <p:nvCxnSpPr>
+          <p:cNvPr id="5" name="직선 화살표 연결선 4">
+            <a:extLst>
+              <a:ext uri="{FF2B5EF4-FFF2-40B4-BE49-F238E27FC236}">
+                <a16:creationId xmlns:a16="http://schemas.microsoft.com/office/drawing/2014/main" id="{12B93C8E-C00E-4002-A3D5-FA0294CD6D7C}"/>
+              </a:ext>
+            </a:extLst>
+          </p:cNvPr>
+          <p:cNvCxnSpPr>
+            <a:cxnSpLocks/>
+          </p:cNvCxnSpPr>
+          <p:nvPr/>
+        </p:nvCxnSpPr>
+        <p:spPr>
+          <a:xfrm flipV="1">
+            <a:off x="2785609" y="836712"/>
+            <a:ext cx="946849" cy="4859316"/>
+          </a:xfrm>
+          <a:prstGeom prst="straightConnector1">
+            <a:avLst/>
+          </a:prstGeom>
+          <a:ln w="57150">
+            <a:solidFill>
+              <a:schemeClr val="tx1"/>
+            </a:solidFill>
+            <a:tailEnd type="triangle"/>
+          </a:ln>
+        </p:spPr>
+        <p:style>
+          <a:lnRef idx="1">
+            <a:schemeClr val="accent1"/>
+          </a:lnRef>
+          <a:fillRef idx="0">
+            <a:schemeClr val="accent1"/>
+          </a:fillRef>
+          <a:effectRef idx="0">
+            <a:schemeClr val="accent1"/>
+          </a:effectRef>
+          <a:fontRef idx="minor">
+            <a:schemeClr val="tx1"/>
+          </a:fontRef>
+        </p:style>
+      </p:cxnSp>
+      <mc:AlternateContent xmlns:mc="http://schemas.openxmlformats.org/markup-compatibility/2006">
+        <mc:Choice xmlns:a14="http://schemas.microsoft.com/office/drawing/2010/main" Requires="a14">
+          <p:sp>
+            <p:nvSpPr>
+              <p:cNvPr id="27" name="TextBox 26">
+                <a:extLst>
+                  <a:ext uri="{FF2B5EF4-FFF2-40B4-BE49-F238E27FC236}">
+                    <a16:creationId xmlns:a16="http://schemas.microsoft.com/office/drawing/2014/main" id="{6613D9F3-7A14-4F77-BF01-40CA03E133F4}"/>
+                  </a:ext>
+                </a:extLst>
+              </p:cNvPr>
+              <p:cNvSpPr txBox="1"/>
+              <p:nvPr/>
+            </p:nvSpPr>
+            <p:spPr>
+              <a:xfrm>
+                <a:off x="4067944" y="4105304"/>
+                <a:ext cx="4224939" cy="1060483"/>
+              </a:xfrm>
+              <a:prstGeom prst="rect">
+                <a:avLst/>
+              </a:prstGeom>
+              <a:noFill/>
+            </p:spPr>
+            <p:txBody>
+              <a:bodyPr wrap="none" rtlCol="0">
+                <a:spAutoFit/>
+              </a:bodyPr>
+              <a:lstStyle/>
+              <a:p>
+                <a14:m>
+                  <m:oMathPara xmlns:m="http://schemas.openxmlformats.org/officeDocument/2006/math">
+                    <m:oMathParaPr>
+                      <m:jc m:val="centerGroup"/>
+                    </m:oMathParaPr>
+                    <m:oMath xmlns:m="http://schemas.openxmlformats.org/officeDocument/2006/math">
+                      <m:r>
+                        <a:rPr lang="en-US" altLang="ko-KR" sz="2800" b="0" i="1" dirty="0" smtClean="0">
+                          <a:solidFill>
+                            <a:srgbClr val="FF0000"/>
+                          </a:solidFill>
+                          <a:latin typeface="Cambria Math" panose="02040503050406030204" pitchFamily="18" charset="0"/>
+                        </a:rPr>
+                        <m:t>𝑐𝑜𝑚</m:t>
+                      </m:r>
+                      <m:sSub>
+                        <m:sSubPr>
+                          <m:ctrlPr>
+                            <a:rPr lang="en-US" altLang="ko-KR" sz="2800" b="0" i="1" dirty="0" smtClean="0">
+                              <a:solidFill>
+                                <a:srgbClr val="FF0000"/>
+                              </a:solidFill>
+                              <a:latin typeface="Cambria Math" panose="02040503050406030204" pitchFamily="18" charset="0"/>
+                            </a:rPr>
+                          </m:ctrlPr>
+                        </m:sSubPr>
+                        <m:e>
+                          <m:r>
+                            <a:rPr lang="en-US" altLang="ko-KR" sz="2800" b="0" i="1" dirty="0" smtClean="0">
+                              <a:solidFill>
+                                <a:srgbClr val="FF0000"/>
+                              </a:solidFill>
+                              <a:latin typeface="Cambria Math" panose="02040503050406030204" pitchFamily="18" charset="0"/>
+                            </a:rPr>
+                            <m:t>𝑝</m:t>
+                          </m:r>
+                        </m:e>
+                        <m:sub>
+                          <m:acc>
+                            <m:accPr>
+                              <m:chr m:val="⃗"/>
+                              <m:ctrlPr>
+                                <a:rPr lang="en-US" altLang="ko-KR" sz="2800" b="0" i="1" dirty="0" smtClean="0">
+                                  <a:solidFill>
+                                    <a:srgbClr val="FF0000"/>
+                                  </a:solidFill>
+                                  <a:latin typeface="Cambria Math" panose="02040503050406030204" pitchFamily="18" charset="0"/>
+                                </a:rPr>
+                              </m:ctrlPr>
+                            </m:accPr>
+                            <m:e>
+                              <m:r>
+                                <a:rPr lang="en-US" altLang="ko-KR" sz="2800" b="0" i="1" dirty="0" smtClean="0">
+                                  <a:solidFill>
+                                    <a:srgbClr val="FF0000"/>
+                                  </a:solidFill>
+                                  <a:latin typeface="Cambria Math" panose="02040503050406030204" pitchFamily="18" charset="0"/>
+                                </a:rPr>
+                                <m:t>𝑎</m:t>
+                              </m:r>
+                            </m:e>
+                          </m:acc>
+                        </m:sub>
+                      </m:sSub>
+                      <m:acc>
+                        <m:accPr>
+                          <m:chr m:val="⃗"/>
+                          <m:ctrlPr>
+                            <a:rPr lang="en-US" altLang="ko-KR" sz="2800" b="0" i="1" dirty="0" smtClean="0">
+                              <a:solidFill>
+                                <a:srgbClr val="FF0000"/>
+                              </a:solidFill>
+                              <a:latin typeface="Cambria Math" panose="02040503050406030204" pitchFamily="18" charset="0"/>
+                            </a:rPr>
+                          </m:ctrlPr>
+                        </m:accPr>
+                        <m:e>
+                          <m:r>
+                            <a:rPr lang="en-US" altLang="ko-KR" sz="2800" b="0" i="1" dirty="0" smtClean="0">
+                              <a:solidFill>
+                                <a:srgbClr val="FF0000"/>
+                              </a:solidFill>
+                              <a:latin typeface="Cambria Math" panose="02040503050406030204" pitchFamily="18" charset="0"/>
+                            </a:rPr>
+                            <m:t>𝑏</m:t>
+                          </m:r>
+                        </m:e>
+                      </m:acc>
+                      <m:r>
+                        <a:rPr lang="en-US" altLang="ko-KR" sz="2800" b="0" i="1" dirty="0" smtClean="0">
+                          <a:solidFill>
+                            <a:srgbClr val="FF0000"/>
+                          </a:solidFill>
+                          <a:latin typeface="Cambria Math" panose="02040503050406030204" pitchFamily="18" charset="0"/>
+                        </a:rPr>
+                        <m:t>⋅</m:t>
+                      </m:r>
+                      <m:d>
+                        <m:dPr>
+                          <m:ctrlPr>
+                            <a:rPr lang="en-US" altLang="ko-KR" sz="2800" b="0" i="1" dirty="0" smtClean="0">
+                              <a:solidFill>
+                                <a:srgbClr val="FF0000"/>
+                              </a:solidFill>
+                              <a:latin typeface="Cambria Math" panose="02040503050406030204" pitchFamily="18" charset="0"/>
+                            </a:rPr>
+                          </m:ctrlPr>
+                        </m:dPr>
+                        <m:e>
+                          <m:f>
+                            <m:fPr>
+                              <m:ctrlPr>
+                                <a:rPr lang="en-US" altLang="ko-KR" sz="2800" b="0" i="1" dirty="0" smtClean="0">
+                                  <a:solidFill>
+                                    <a:srgbClr val="FF0000"/>
+                                  </a:solidFill>
+                                  <a:latin typeface="Cambria Math" panose="02040503050406030204" pitchFamily="18" charset="0"/>
+                                </a:rPr>
+                              </m:ctrlPr>
+                            </m:fPr>
+                            <m:num>
+                              <m:acc>
+                                <m:accPr>
+                                  <m:chr m:val="⃗"/>
+                                  <m:ctrlPr>
+                                    <a:rPr lang="en-US" altLang="ko-KR" sz="2800" b="0" i="1" dirty="0" smtClean="0">
+                                      <a:solidFill>
+                                        <a:srgbClr val="FF0000"/>
+                                      </a:solidFill>
+                                      <a:latin typeface="Cambria Math" panose="02040503050406030204" pitchFamily="18" charset="0"/>
+                                    </a:rPr>
+                                  </m:ctrlPr>
+                                </m:accPr>
+                                <m:e>
+                                  <m:r>
+                                    <a:rPr lang="en-US" altLang="ko-KR" sz="2800" b="0" i="1" dirty="0" smtClean="0">
+                                      <a:solidFill>
+                                        <a:srgbClr val="FF0000"/>
+                                      </a:solidFill>
+                                      <a:latin typeface="Cambria Math" panose="02040503050406030204" pitchFamily="18" charset="0"/>
+                                    </a:rPr>
+                                    <m:t>𝑎</m:t>
+                                  </m:r>
+                                </m:e>
+                              </m:acc>
+                            </m:num>
+                            <m:den>
+                              <m:d>
+                                <m:dPr>
+                                  <m:begChr m:val="|"/>
+                                  <m:endChr m:val="|"/>
+                                  <m:ctrlPr>
+                                    <a:rPr lang="en-US" altLang="ko-KR" sz="2800" b="0" i="1" dirty="0" smtClean="0">
+                                      <a:solidFill>
+                                        <a:srgbClr val="FF0000"/>
+                                      </a:solidFill>
+                                      <a:latin typeface="Cambria Math" panose="02040503050406030204" pitchFamily="18" charset="0"/>
+                                    </a:rPr>
+                                  </m:ctrlPr>
+                                </m:dPr>
+                                <m:e>
+                                  <m:acc>
+                                    <m:accPr>
+                                      <m:chr m:val="⃗"/>
+                                      <m:ctrlPr>
+                                        <a:rPr lang="en-US" altLang="ko-KR" sz="2800" b="0" i="1" dirty="0" smtClean="0">
+                                          <a:solidFill>
+                                            <a:srgbClr val="FF0000"/>
+                                          </a:solidFill>
+                                          <a:latin typeface="Cambria Math" panose="02040503050406030204" pitchFamily="18" charset="0"/>
+                                        </a:rPr>
+                                      </m:ctrlPr>
+                                    </m:accPr>
+                                    <m:e>
+                                      <m:r>
+                                        <a:rPr lang="en-US" altLang="ko-KR" sz="2800" b="0" i="1" dirty="0" smtClean="0">
+                                          <a:solidFill>
+                                            <a:srgbClr val="FF0000"/>
+                                          </a:solidFill>
+                                          <a:latin typeface="Cambria Math" panose="02040503050406030204" pitchFamily="18" charset="0"/>
+                                        </a:rPr>
+                                        <m:t>𝑎</m:t>
+                                      </m:r>
+                                    </m:e>
+                                  </m:acc>
+                                </m:e>
+                              </m:d>
+                            </m:den>
+                          </m:f>
+                        </m:e>
+                      </m:d>
+                      <m:r>
+                        <a:rPr lang="en-US" altLang="ko-KR" sz="2800" b="0" i="1" dirty="0" smtClean="0">
+                          <a:solidFill>
+                            <a:srgbClr val="FF0000"/>
+                          </a:solidFill>
+                          <a:latin typeface="Cambria Math" panose="02040503050406030204" pitchFamily="18" charset="0"/>
+                        </a:rPr>
+                        <m:t>=</m:t>
+                      </m:r>
+                      <m:r>
+                        <a:rPr lang="en-US" altLang="ko-KR" sz="2800" b="0" i="1" smtClean="0">
+                          <a:solidFill>
+                            <a:srgbClr val="FF0000"/>
+                          </a:solidFill>
+                          <a:latin typeface="Cambria Math" panose="02040503050406030204" pitchFamily="18" charset="0"/>
+                        </a:rPr>
+                        <m:t>𝑝𝑟𝑜</m:t>
+                      </m:r>
+                      <m:sSub>
+                        <m:sSubPr>
+                          <m:ctrlPr>
+                            <a:rPr lang="en-US" altLang="ko-KR" sz="2800" b="0" i="1" smtClean="0">
+                              <a:solidFill>
+                                <a:srgbClr val="FF0000"/>
+                              </a:solidFill>
+                              <a:latin typeface="Cambria Math" panose="02040503050406030204" pitchFamily="18" charset="0"/>
+                            </a:rPr>
+                          </m:ctrlPr>
+                        </m:sSubPr>
+                        <m:e>
+                          <m:r>
+                            <a:rPr lang="en-US" altLang="ko-KR" sz="2800" b="0" i="1" smtClean="0">
+                              <a:solidFill>
+                                <a:srgbClr val="FF0000"/>
+                              </a:solidFill>
+                              <a:latin typeface="Cambria Math" panose="02040503050406030204" pitchFamily="18" charset="0"/>
+                            </a:rPr>
+                            <m:t>𝑗</m:t>
+                          </m:r>
+                        </m:e>
+                        <m:sub>
+                          <m:acc>
+                            <m:accPr>
+                              <m:chr m:val="⃗"/>
+                              <m:ctrlPr>
+                                <a:rPr lang="en-US" altLang="ko-KR" sz="2800" b="0" i="1" smtClean="0">
+                                  <a:solidFill>
+                                    <a:srgbClr val="FF0000"/>
+                                  </a:solidFill>
+                                  <a:latin typeface="Cambria Math" panose="02040503050406030204" pitchFamily="18" charset="0"/>
+                                </a:rPr>
+                              </m:ctrlPr>
+                            </m:accPr>
+                            <m:e>
+                              <m:r>
+                                <a:rPr lang="en-US" altLang="ko-KR" sz="2800" b="0" i="1" smtClean="0">
+                                  <a:solidFill>
+                                    <a:srgbClr val="FF0000"/>
+                                  </a:solidFill>
+                                  <a:latin typeface="Cambria Math" panose="02040503050406030204" pitchFamily="18" charset="0"/>
+                                </a:rPr>
+                                <m:t>𝑎</m:t>
+                              </m:r>
+                            </m:e>
+                          </m:acc>
+                        </m:sub>
+                      </m:sSub>
+                      <m:acc>
+                        <m:accPr>
+                          <m:chr m:val="⃗"/>
+                          <m:ctrlPr>
+                            <a:rPr lang="en-US" altLang="ko-KR" sz="2800" i="1">
+                              <a:solidFill>
+                                <a:srgbClr val="FF0000"/>
+                              </a:solidFill>
+                              <a:latin typeface="Cambria Math" panose="02040503050406030204" pitchFamily="18" charset="0"/>
+                            </a:rPr>
+                          </m:ctrlPr>
+                        </m:accPr>
+                        <m:e>
+                          <m:r>
+                            <a:rPr lang="en-US" altLang="ko-KR" sz="2800" i="1">
+                              <a:solidFill>
+                                <a:srgbClr val="FF0000"/>
+                              </a:solidFill>
+                              <a:latin typeface="Cambria Math" panose="02040503050406030204" pitchFamily="18" charset="0"/>
+                            </a:rPr>
+                            <m:t>𝑏</m:t>
+                          </m:r>
+                        </m:e>
+                      </m:acc>
+                    </m:oMath>
+                  </m:oMathPara>
+                </a14:m>
+                <a:endParaRPr lang="en-US" altLang="ko-KR" sz="2800" dirty="0">
+                  <a:solidFill>
+                    <a:srgbClr val="FF0000"/>
+                  </a:solidFill>
+                </a:endParaRPr>
+              </a:p>
+            </p:txBody>
+          </p:sp>
+        </mc:Choice>
+        <mc:Fallback>
+          <p:sp>
+            <p:nvSpPr>
+              <p:cNvPr id="27" name="TextBox 26">
+                <a:extLst>
+                  <a:ext uri="{FF2B5EF4-FFF2-40B4-BE49-F238E27FC236}">
+                    <a16:creationId xmlns:a16="http://schemas.microsoft.com/office/drawing/2014/main" id="{6613D9F3-7A14-4F77-BF01-40CA03E133F4}"/>
+                  </a:ext>
+                </a:extLst>
+              </p:cNvPr>
+              <p:cNvSpPr txBox="1">
+                <a:spLocks noRot="1" noChangeAspect="1" noMove="1" noResize="1" noEditPoints="1" noAdjustHandles="1" noChangeArrowheads="1" noChangeShapeType="1" noTextEdit="1"/>
+              </p:cNvSpPr>
+              <p:nvPr/>
+            </p:nvSpPr>
+            <p:spPr>
+              <a:xfrm>
+                <a:off x="4067944" y="4105304"/>
+                <a:ext cx="4224939" cy="1060483"/>
+              </a:xfrm>
+              <a:prstGeom prst="rect">
+                <a:avLst/>
+              </a:prstGeom>
+              <a:blipFill>
+                <a:blip r:embed="rId5"/>
+                <a:stretch>
+                  <a:fillRect/>
+                </a:stretch>
+              </a:blipFill>
+            </p:spPr>
+            <p:txBody>
+              <a:bodyPr/>
+              <a:lstStyle/>
+              <a:p>
+                <a:r>
+                  <a:rPr lang="ko-KR" altLang="en-US">
+                    <a:noFill/>
+                  </a:rPr>
+                  <a:t> </a:t>
+                </a:r>
+              </a:p>
+            </p:txBody>
+          </p:sp>
+        </mc:Fallback>
+      </mc:AlternateContent>
+      <mc:AlternateContent xmlns:mc="http://schemas.openxmlformats.org/markup-compatibility/2006">
+        <mc:Choice xmlns:a14="http://schemas.microsoft.com/office/drawing/2010/main" Requires="a14">
+          <p:sp>
+            <p:nvSpPr>
+              <p:cNvPr id="29" name="TextBox 28">
+                <a:extLst>
+                  <a:ext uri="{FF2B5EF4-FFF2-40B4-BE49-F238E27FC236}">
+                    <a16:creationId xmlns:a16="http://schemas.microsoft.com/office/drawing/2014/main" id="{134DC0A7-85D5-4797-98AD-E086BC3532A9}"/>
+                  </a:ext>
+                </a:extLst>
+              </p:cNvPr>
+              <p:cNvSpPr txBox="1"/>
+              <p:nvPr/>
+            </p:nvSpPr>
+            <p:spPr>
+              <a:xfrm>
+                <a:off x="3848743" y="5186099"/>
+                <a:ext cx="4663340" cy="549865"/>
+              </a:xfrm>
+              <a:prstGeom prst="rect">
+                <a:avLst/>
+              </a:prstGeom>
+              <a:noFill/>
+            </p:spPr>
+            <p:txBody>
+              <a:bodyPr wrap="square">
+                <a:spAutoFit/>
+              </a:bodyPr>
+              <a:lstStyle/>
+              <a:p>
+                <a:pPr algn="ctr"/>
+                <a:r>
+                  <a:rPr lang="ko-KR" altLang="en-US" sz="2400" dirty="0">
+                    <a:latin typeface="배달의민족 주아" panose="02020603020101020101" pitchFamily="18" charset="-127"/>
+                    <a:ea typeface="배달의민족 주아" panose="02020603020101020101" pitchFamily="18" charset="-127"/>
+                  </a:rPr>
+                  <a:t>벡터 </a:t>
+                </a:r>
+                <a14:m>
+                  <m:oMath xmlns:m="http://schemas.openxmlformats.org/officeDocument/2006/math">
+                    <m:acc>
+                      <m:accPr>
+                        <m:chr m:val="⃗"/>
+                        <m:ctrlPr>
+                          <a:rPr lang="en-US" altLang="ko-KR" sz="2400" b="0" i="1" smtClean="0">
+                            <a:latin typeface="Cambria Math" panose="02040503050406030204" pitchFamily="18" charset="0"/>
+                          </a:rPr>
+                        </m:ctrlPr>
+                      </m:accPr>
+                      <m:e>
+                        <m:r>
+                          <a:rPr lang="en-US" altLang="ko-KR" sz="2400" b="0" i="1" smtClean="0">
+                            <a:latin typeface="Cambria Math" panose="02040503050406030204" pitchFamily="18" charset="0"/>
+                          </a:rPr>
+                          <m:t>𝑏</m:t>
+                        </m:r>
+                      </m:e>
+                    </m:acc>
+                    <m:r>
+                      <a:rPr lang="ko-KR" altLang="en-US" sz="2400" i="1" dirty="0">
+                        <a:latin typeface="Cambria Math" panose="02040503050406030204" pitchFamily="18" charset="0"/>
+                      </a:rPr>
+                      <m:t>의</m:t>
+                    </m:r>
+                  </m:oMath>
+                </a14:m>
+                <a:r>
+                  <a:rPr lang="ko-KR" altLang="en-US" sz="2400" dirty="0">
+                    <a:latin typeface="배달의민족 주아" panose="02020603020101020101" pitchFamily="18" charset="-127"/>
+                    <a:ea typeface="배달의민족 주아" panose="02020603020101020101" pitchFamily="18" charset="-127"/>
+                  </a:rPr>
+                  <a:t> </a:t>
+                </a:r>
+                <a14:m>
+                  <m:oMath xmlns:m="http://schemas.openxmlformats.org/officeDocument/2006/math">
+                    <m:acc>
+                      <m:accPr>
+                        <m:chr m:val="⃗"/>
+                        <m:ctrlPr>
+                          <a:rPr lang="en-US" altLang="ko-KR" sz="2400" b="0" i="1" dirty="0" smtClean="0">
+                            <a:latin typeface="Cambria Math" panose="02040503050406030204" pitchFamily="18" charset="0"/>
+                          </a:rPr>
+                        </m:ctrlPr>
+                      </m:accPr>
+                      <m:e>
+                        <m:r>
+                          <a:rPr lang="en-US" altLang="ko-KR" sz="2400" b="0" i="1" dirty="0" smtClean="0">
+                            <a:latin typeface="Cambria Math" panose="02040503050406030204" pitchFamily="18" charset="0"/>
+                          </a:rPr>
+                          <m:t>𝑎</m:t>
+                        </m:r>
+                      </m:e>
+                    </m:acc>
+                    <m:r>
+                      <a:rPr lang="en-US" altLang="ko-KR" sz="2400" b="0" i="1" dirty="0" smtClean="0">
+                        <a:latin typeface="Cambria Math" panose="02040503050406030204" pitchFamily="18" charset="0"/>
+                      </a:rPr>
+                      <m:t> </m:t>
+                    </m:r>
+                  </m:oMath>
+                </a14:m>
+                <a:r>
+                  <a:rPr lang="ko-KR" altLang="en-US" sz="2400" dirty="0">
+                    <a:latin typeface="배달의민족 주아" panose="02020603020101020101" pitchFamily="18" charset="-127"/>
+                    <a:ea typeface="배달의민족 주아" panose="02020603020101020101" pitchFamily="18" charset="-127"/>
+                  </a:rPr>
+                  <a:t>방향으로의 정사영 </a:t>
+                </a:r>
+                <a:r>
+                  <a:rPr lang="en-US" altLang="ko-KR" sz="2400" dirty="0">
+                    <a:latin typeface="배달의민족 주아" panose="02020603020101020101" pitchFamily="18" charset="-127"/>
+                    <a:ea typeface="배달의민족 주아" panose="02020603020101020101" pitchFamily="18" charset="-127"/>
+                  </a:rPr>
+                  <a:t>(</a:t>
+                </a:r>
+                <a:r>
+                  <a:rPr lang="ko-KR" altLang="en-US" sz="2400" dirty="0">
+                    <a:latin typeface="배달의민족 주아" panose="02020603020101020101" pitchFamily="18" charset="-127"/>
+                    <a:ea typeface="배달의민족 주아" panose="02020603020101020101" pitchFamily="18" charset="-127"/>
+                  </a:rPr>
+                  <a:t>벡터</a:t>
+                </a:r>
+                <a:r>
+                  <a:rPr lang="en-US" altLang="ko-KR" sz="2400" dirty="0">
+                    <a:latin typeface="배달의민족 주아" panose="02020603020101020101" pitchFamily="18" charset="-127"/>
+                    <a:ea typeface="배달의민족 주아" panose="02020603020101020101" pitchFamily="18" charset="-127"/>
+                  </a:rPr>
+                  <a:t>)</a:t>
+                </a:r>
+              </a:p>
+            </p:txBody>
+          </p:sp>
+        </mc:Choice>
+        <mc:Fallback>
+          <p:sp>
+            <p:nvSpPr>
+              <p:cNvPr id="29" name="TextBox 28">
+                <a:extLst>
+                  <a:ext uri="{FF2B5EF4-FFF2-40B4-BE49-F238E27FC236}">
+                    <a16:creationId xmlns:a16="http://schemas.microsoft.com/office/drawing/2014/main" id="{134DC0A7-85D5-4797-98AD-E086BC3532A9}"/>
+                  </a:ext>
+                </a:extLst>
+              </p:cNvPr>
+              <p:cNvSpPr txBox="1">
+                <a:spLocks noRot="1" noChangeAspect="1" noMove="1" noResize="1" noEditPoints="1" noAdjustHandles="1" noChangeArrowheads="1" noChangeShapeType="1" noTextEdit="1"/>
+              </p:cNvSpPr>
+              <p:nvPr/>
+            </p:nvSpPr>
+            <p:spPr>
+              <a:xfrm>
+                <a:off x="3848743" y="5186099"/>
+                <a:ext cx="4663340" cy="549865"/>
+              </a:xfrm>
+              <a:prstGeom prst="rect">
+                <a:avLst/>
+              </a:prstGeom>
+              <a:blipFill>
+                <a:blip r:embed="rId6"/>
+                <a:stretch>
+                  <a:fillRect b="-20000"/>
+                </a:stretch>
+              </a:blipFill>
+            </p:spPr>
+            <p:txBody>
+              <a:bodyPr/>
+              <a:lstStyle/>
+              <a:p>
+                <a:r>
+                  <a:rPr lang="ko-KR" altLang="en-US">
+                    <a:noFill/>
+                  </a:rPr>
+                  <a:t> </a:t>
+                </a:r>
+              </a:p>
+            </p:txBody>
+          </p:sp>
+        </mc:Fallback>
+      </mc:AlternateContent>
+    </p:spTree>
+    <p:extLst>
+      <p:ext uri="{BB962C8B-B14F-4D97-AF65-F5344CB8AC3E}">
+        <p14:creationId xmlns:p14="http://schemas.microsoft.com/office/powerpoint/2010/main" val="2326454113"/>
+      </p:ext>
+    </p:extLst>
+  </p:cSld>
+  <p:clrMapOvr>
+    <a:masterClrMapping/>
+  </p:clrMapOvr>
+</p:sld>
+</file>
+
+<file path=ppt/slides/slide3.xml><?xml version="1.0" encoding="utf-8"?>
+<p:sld xmlns:a="http://schemas.openxmlformats.org/drawingml/2006/main" xmlns:r="http://schemas.openxmlformats.org/officeDocument/2006/relationships" xmlns:p="http://schemas.openxmlformats.org/presentationml/2006/main">
+  <p:cSld>
+    <p:spTree>
+      <p:nvGrpSpPr>
+        <p:cNvPr id="1" name=""/>
+        <p:cNvGrpSpPr/>
+        <p:nvPr/>
+      </p:nvGrpSpPr>
+      <p:grpSpPr>
+        <a:xfrm>
+          <a:off x="0" y="0"/>
+          <a:ext cx="0" cy="0"/>
+          <a:chOff x="0" y="0"/>
+          <a:chExt cx="0" cy="0"/>
+        </a:xfrm>
+      </p:grpSpPr>
+      <p:sp>
+        <p:nvSpPr>
           <p:cNvPr id="5" name="직사각형 4"/>
           <p:cNvSpPr/>
           <p:nvPr/>
@@ -3177,7 +5462,7 @@
                         <m:sSubPr>
                           <m:ctrlPr>
                             <a:rPr lang="en-US" altLang="ko-KR" sz="5400" b="0" i="1" smtClean="0">
-                              <a:latin typeface="Cambria Math"/>
+                              <a:latin typeface="Cambria Math" panose="02040503050406030204" pitchFamily="18" charset="0"/>
                             </a:rPr>
                           </m:ctrlPr>
                         </m:sSubPr>
@@ -3208,7 +5493,7 @@
                         <m:sSubPr>
                           <m:ctrlPr>
                             <a:rPr lang="en-US" altLang="ko-KR" sz="5400" b="0" i="1" smtClean="0">
-                              <a:latin typeface="Cambria Math"/>
+                              <a:latin typeface="Cambria Math" panose="02040503050406030204" pitchFamily="18" charset="0"/>
                             </a:rPr>
                           </m:ctrlPr>
                         </m:sSubPr>
@@ -3239,7 +5524,7 @@
                         <m:sSubPr>
                           <m:ctrlPr>
                             <a:rPr lang="en-US" altLang="ko-KR" sz="5400" b="0" i="1" smtClean="0">
-                              <a:latin typeface="Cambria Math"/>
+                              <a:latin typeface="Cambria Math" panose="02040503050406030204" pitchFamily="18" charset="0"/>
                             </a:rPr>
                           </m:ctrlPr>
                         </m:sSubPr>
@@ -3259,7 +5544,7 @@
                             <m:sSubPr>
                               <m:ctrlPr>
                                 <a:rPr lang="en-US" altLang="ko-KR" sz="5400" b="0" i="1" smtClean="0">
-                                  <a:latin typeface="Cambria Math"/>
+                                  <a:latin typeface="Cambria Math" panose="02040503050406030204" pitchFamily="18" charset="0"/>
                                 </a:rPr>
                               </m:ctrlPr>
                             </m:sSubPr>
@@ -3292,7 +5577,7 @@
                         <m:sSubPr>
                           <m:ctrlPr>
                             <a:rPr lang="en-US" altLang="ko-KR" sz="5400" b="0" i="1" smtClean="0">
-                              <a:latin typeface="Cambria Math"/>
+                              <a:latin typeface="Cambria Math" panose="02040503050406030204" pitchFamily="18" charset="0"/>
                             </a:rPr>
                           </m:ctrlPr>
                         </m:sSubPr>
@@ -3397,7 +5682,7 @@
                       <m:sSubPr>
                         <m:ctrlPr>
                           <a:rPr lang="en-US" altLang="ko-KR" sz="3200" b="0" i="1" smtClean="0">
-                            <a:latin typeface="Cambria Math"/>
+                            <a:latin typeface="Cambria Math" panose="02040503050406030204" pitchFamily="18" charset="0"/>
                           </a:rPr>
                         </m:ctrlPr>
                       </m:sSubPr>
@@ -3421,7 +5706,7 @@
                   </m:oMath>
                 </a14:m>
                 <a:r>
-                  <a:rPr lang="ko-KR" altLang="en-US" sz="3200" dirty="0" smtClean="0">
+                  <a:rPr lang="ko-KR" altLang="en-US" sz="3200" dirty="0">
                     <a:latin typeface="KoPub돋움체 Bold" pitchFamily="18" charset="-127"/>
                     <a:ea typeface="KoPub돋움체 Bold" pitchFamily="18" charset="-127"/>
                   </a:rPr>
@@ -3433,7 +5718,7 @@
                       <m:sSubPr>
                         <m:ctrlPr>
                           <a:rPr lang="en-US" altLang="ko-KR" sz="3200" b="0" i="1" smtClean="0">
-                            <a:latin typeface="Cambria Math"/>
+                            <a:latin typeface="Cambria Math" panose="02040503050406030204" pitchFamily="18" charset="0"/>
                           </a:rPr>
                         </m:ctrlPr>
                       </m:sSubPr>
@@ -3457,16 +5742,12 @@
                   </m:oMath>
                 </a14:m>
                 <a:r>
-                  <a:rPr lang="ko-KR" altLang="en-US" sz="3200" dirty="0" smtClean="0">
+                  <a:rPr lang="ko-KR" altLang="en-US" sz="3200" dirty="0">
                     <a:latin typeface="KoPub돋움체 Bold" pitchFamily="18" charset="-127"/>
                     <a:ea typeface="KoPub돋움체 Bold" pitchFamily="18" charset="-127"/>
                   </a:rPr>
                   <a:t>관련 성분</a:t>
                 </a:r>
-                <a:endParaRPr lang="ko-KR" altLang="en-US" sz="3200" dirty="0">
-                  <a:latin typeface="KoPub돋움체 Bold" pitchFamily="18" charset="-127"/>
-                  <a:ea typeface="KoPub돋움체 Bold" pitchFamily="18" charset="-127"/>
-                </a:endParaRPr>
               </a:p>
             </p:txBody>
           </p:sp>
@@ -3561,7 +5842,7 @@
 </p:sld>
 </file>
 
-<file path=ppt/slides/slide2.xml><?xml version="1.0" encoding="utf-8"?>
+<file path=ppt/slides/slide4.xml><?xml version="1.0" encoding="utf-8"?>
 <p:sld xmlns:a="http://schemas.openxmlformats.org/drawingml/2006/main" xmlns:r="http://schemas.openxmlformats.org/officeDocument/2006/relationships" xmlns:p="http://schemas.openxmlformats.org/presentationml/2006/main">
   <p:cSld>
     <p:spTree>
@@ -3772,8 +6053,8 @@
             </a:fontRef>
           </p:style>
         </p:cxnSp>
-        <mc:AlternateContent xmlns:mc="http://schemas.openxmlformats.org/markup-compatibility/2006">
-          <mc:Choice xmlns:a14="http://schemas.microsoft.com/office/drawing/2010/main" Requires="a14">
+        <mc:AlternateContent xmlns:mc="http://schemas.openxmlformats.org/markup-compatibility/2006" xmlns:a14="http://schemas.microsoft.com/office/drawing/2010/main">
+          <mc:Choice Requires="a14">
             <p:sp>
               <p:nvSpPr>
                 <p:cNvPr id="22" name="TextBox 21"/>
@@ -3807,7 +6088,7 @@
                           <m:sSubPr>
                             <m:ctrlPr>
                               <a:rPr lang="en-US" altLang="ko-KR" sz="2800" b="0" i="1" smtClean="0">
-                                <a:latin typeface="Cambria Math"/>
+                                <a:latin typeface="Cambria Math" panose="02040503050406030204" pitchFamily="18" charset="0"/>
                               </a:rPr>
                             </m:ctrlPr>
                           </m:sSubPr>
@@ -3836,7 +6117,7 @@
               </p:txBody>
             </p:sp>
           </mc:Choice>
-          <mc:Fallback>
+          <mc:Fallback xmlns="">
             <p:sp>
               <p:nvSpPr>
                 <p:cNvPr id="22" name="TextBox 21"/>
@@ -3875,8 +6156,8 @@
             </p:sp>
           </mc:Fallback>
         </mc:AlternateContent>
-        <mc:AlternateContent xmlns:mc="http://schemas.openxmlformats.org/markup-compatibility/2006">
-          <mc:Choice xmlns:a14="http://schemas.microsoft.com/office/drawing/2010/main" Requires="a14">
+        <mc:AlternateContent xmlns:mc="http://schemas.openxmlformats.org/markup-compatibility/2006" xmlns:a14="http://schemas.microsoft.com/office/drawing/2010/main">
+          <mc:Choice Requires="a14">
             <p:sp>
               <p:nvSpPr>
                 <p:cNvPr id="23" name="TextBox 22"/>
@@ -3910,7 +6191,7 @@
                           <m:sSubPr>
                             <m:ctrlPr>
                               <a:rPr lang="en-US" altLang="ko-KR" sz="2800" b="0" i="1" smtClean="0">
-                                <a:latin typeface="Cambria Math"/>
+                                <a:latin typeface="Cambria Math" panose="02040503050406030204" pitchFamily="18" charset="0"/>
                               </a:rPr>
                             </m:ctrlPr>
                           </m:sSubPr>
@@ -3939,7 +6220,7 @@
               </p:txBody>
             </p:sp>
           </mc:Choice>
-          <mc:Fallback>
+          <mc:Fallback xmlns="">
             <p:sp>
               <p:nvSpPr>
                 <p:cNvPr id="23" name="TextBox 22"/>
@@ -3978,8 +6259,8 @@
             </p:sp>
           </mc:Fallback>
         </mc:AlternateContent>
-        <mc:AlternateContent xmlns:mc="http://schemas.openxmlformats.org/markup-compatibility/2006">
-          <mc:Choice xmlns:a14="http://schemas.microsoft.com/office/drawing/2010/main" Requires="a14">
+        <mc:AlternateContent xmlns:mc="http://schemas.openxmlformats.org/markup-compatibility/2006" xmlns:a14="http://schemas.microsoft.com/office/drawing/2010/main">
+          <mc:Choice Requires="a14">
             <p:sp>
               <p:nvSpPr>
                 <p:cNvPr id="24" name="TextBox 23"/>
@@ -4012,8 +6293,8 @@
                         <m:sSub>
                           <m:sSubPr>
                             <m:ctrlPr>
-                              <a:rPr lang="en-US" altLang="ko-KR" sz="2800" b="0" i="0" smtClean="0">
-                                <a:latin typeface="Cambria Math"/>
+                              <a:rPr lang="en-US" altLang="ko-KR" sz="2800" b="0" i="1" smtClean="0">
+                                <a:latin typeface="Cambria Math" panose="02040503050406030204" pitchFamily="18" charset="0"/>
                               </a:rPr>
                             </m:ctrlPr>
                           </m:sSubPr>
@@ -4032,8 +6313,8 @@
                             <m:sSub>
                               <m:sSubPr>
                                 <m:ctrlPr>
-                                  <a:rPr lang="en-US" altLang="ko-KR" sz="2800" b="0" i="0" smtClean="0">
-                                    <a:latin typeface="Cambria Math"/>
+                                  <a:rPr lang="en-US" altLang="ko-KR" sz="2800" b="0" i="1" smtClean="0">
+                                    <a:latin typeface="Cambria Math" panose="02040503050406030204" pitchFamily="18" charset="0"/>
                                   </a:rPr>
                                 </m:ctrlPr>
                               </m:sSubPr>
@@ -4062,8 +6343,8 @@
                         <m:sSub>
                           <m:sSubPr>
                             <m:ctrlPr>
-                              <a:rPr lang="en-US" altLang="ko-KR" sz="2800" b="0" i="0" smtClean="0">
-                                <a:latin typeface="Cambria Math"/>
+                              <a:rPr lang="en-US" altLang="ko-KR" sz="2800" b="0" i="1" smtClean="0">
+                                <a:latin typeface="Cambria Math" panose="02040503050406030204" pitchFamily="18" charset="0"/>
                               </a:rPr>
                             </m:ctrlPr>
                           </m:sSubPr>
@@ -4095,7 +6376,7 @@
               </p:txBody>
             </p:sp>
           </mc:Choice>
-          <mc:Fallback>
+          <mc:Fallback xmlns="">
             <p:sp>
               <p:nvSpPr>
                 <p:cNvPr id="24" name="TextBox 23"/>
@@ -4242,8 +6523,8 @@
             </a:fontRef>
           </p:style>
         </p:cxnSp>
-        <mc:AlternateContent xmlns:mc="http://schemas.openxmlformats.org/markup-compatibility/2006">
-          <mc:Choice xmlns:a14="http://schemas.microsoft.com/office/drawing/2010/main" Requires="a14">
+        <mc:AlternateContent xmlns:mc="http://schemas.openxmlformats.org/markup-compatibility/2006" xmlns:a14="http://schemas.microsoft.com/office/drawing/2010/main">
+          <mc:Choice Requires="a14">
             <p:sp>
               <p:nvSpPr>
                 <p:cNvPr id="32" name="TextBox 31"/>
@@ -4277,7 +6558,7 @@
                           <m:sSubPr>
                             <m:ctrlPr>
                               <a:rPr lang="en-US" altLang="ko-KR" sz="2800" b="0" i="1" smtClean="0">
-                                <a:latin typeface="Cambria Math"/>
+                                <a:latin typeface="Cambria Math" panose="02040503050406030204" pitchFamily="18" charset="0"/>
                               </a:rPr>
                             </m:ctrlPr>
                           </m:sSubPr>
@@ -4308,7 +6589,7 @@
                           <m:sSubPr>
                             <m:ctrlPr>
                               <a:rPr lang="en-US" altLang="ko-KR" sz="2800" b="0" i="1" smtClean="0">
-                                <a:latin typeface="Cambria Math"/>
+                                <a:latin typeface="Cambria Math" panose="02040503050406030204" pitchFamily="18" charset="0"/>
                               </a:rPr>
                             </m:ctrlPr>
                           </m:sSubPr>
@@ -4337,7 +6618,7 @@
               </p:txBody>
             </p:sp>
           </mc:Choice>
-          <mc:Fallback>
+          <mc:Fallback xmlns="">
             <p:sp>
               <p:nvSpPr>
                 <p:cNvPr id="32" name="TextBox 31"/>
@@ -4376,8 +6657,8 @@
             </p:sp>
           </mc:Fallback>
         </mc:AlternateContent>
-        <mc:AlternateContent xmlns:mc="http://schemas.openxmlformats.org/markup-compatibility/2006">
-          <mc:Choice xmlns:a14="http://schemas.microsoft.com/office/drawing/2010/main" Requires="a14">
+        <mc:AlternateContent xmlns:mc="http://schemas.openxmlformats.org/markup-compatibility/2006" xmlns:a14="http://schemas.microsoft.com/office/drawing/2010/main">
+          <mc:Choice Requires="a14">
             <p:sp>
               <p:nvSpPr>
                 <p:cNvPr id="33" name="TextBox 32"/>
@@ -4411,7 +6692,7 @@
                           <m:sSubPr>
                             <m:ctrlPr>
                               <a:rPr lang="en-US" altLang="ko-KR" sz="2800" b="0" i="1" smtClean="0">
-                                <a:latin typeface="Cambria Math"/>
+                                <a:latin typeface="Cambria Math" panose="02040503050406030204" pitchFamily="18" charset="0"/>
                               </a:rPr>
                             </m:ctrlPr>
                           </m:sSubPr>
@@ -4440,7 +6721,7 @@
               </p:txBody>
             </p:sp>
           </mc:Choice>
-          <mc:Fallback>
+          <mc:Fallback xmlns="">
             <p:sp>
               <p:nvSpPr>
                 <p:cNvPr id="33" name="TextBox 32"/>
@@ -4479,8 +6760,8 @@
             </p:sp>
           </mc:Fallback>
         </mc:AlternateContent>
-        <mc:AlternateContent xmlns:mc="http://schemas.openxmlformats.org/markup-compatibility/2006">
-          <mc:Choice xmlns:a14="http://schemas.microsoft.com/office/drawing/2010/main" Requires="a14">
+        <mc:AlternateContent xmlns:mc="http://schemas.openxmlformats.org/markup-compatibility/2006" xmlns:a14="http://schemas.microsoft.com/office/drawing/2010/main">
+          <mc:Choice Requires="a14">
             <p:sp>
               <p:nvSpPr>
                 <p:cNvPr id="34" name="TextBox 33"/>
@@ -4514,7 +6795,7 @@
                           <m:sSubPr>
                             <m:ctrlPr>
                               <a:rPr lang="en-US" altLang="ko-KR" sz="2800" b="0" i="1" smtClean="0">
-                                <a:latin typeface="Cambria Math"/>
+                                <a:latin typeface="Cambria Math" panose="02040503050406030204" pitchFamily="18" charset="0"/>
                               </a:rPr>
                             </m:ctrlPr>
                           </m:sSubPr>
@@ -4543,7 +6824,7 @@
               </p:txBody>
             </p:sp>
           </mc:Choice>
-          <mc:Fallback>
+          <mc:Fallback xmlns="">
             <p:sp>
               <p:nvSpPr>
                 <p:cNvPr id="34" name="TextBox 33"/>

</xml_diff>